<commit_message>
Updated readme figures with Phase 1 workflow
</commit_message>
<xml_diff>
--- a/READMEfigs/READMEfigs.pptx
+++ b/READMEfigs/READMEfigs.pptx
@@ -7,6 +7,8 @@
   <p:sldIdLst>
     <p:sldId id="256" r:id="rId2"/>
     <p:sldId id="257" r:id="rId3"/>
+    <p:sldId id="259" r:id="rId4"/>
+    <p:sldId id="258" r:id="rId5"/>
   </p:sldIdLst>
   <p:sldSz cx="12192000" cy="6858000"/>
   <p:notesSz cx="6858000" cy="9144000"/>
@@ -244,7 +246,7 @@
           <a:p>
             <a:fld id="{11D67388-0790-496E-9A12-37055489AF4F}" type="datetimeFigureOut">
               <a:rPr lang="en-US" smtClean="0"/>
-              <a:t>10/11/2018</a:t>
+              <a:t>11/1/2018</a:t>
             </a:fld>
             <a:endParaRPr lang="en-US"/>
           </a:p>
@@ -414,7 +416,7 @@
           <a:p>
             <a:fld id="{11D67388-0790-496E-9A12-37055489AF4F}" type="datetimeFigureOut">
               <a:rPr lang="en-US" smtClean="0"/>
-              <a:t>10/11/2018</a:t>
+              <a:t>11/1/2018</a:t>
             </a:fld>
             <a:endParaRPr lang="en-US"/>
           </a:p>
@@ -594,7 +596,7 @@
           <a:p>
             <a:fld id="{11D67388-0790-496E-9A12-37055489AF4F}" type="datetimeFigureOut">
               <a:rPr lang="en-US" smtClean="0"/>
-              <a:t>10/11/2018</a:t>
+              <a:t>11/1/2018</a:t>
             </a:fld>
             <a:endParaRPr lang="en-US"/>
           </a:p>
@@ -764,7 +766,7 @@
           <a:p>
             <a:fld id="{11D67388-0790-496E-9A12-37055489AF4F}" type="datetimeFigureOut">
               <a:rPr lang="en-US" smtClean="0"/>
-              <a:t>10/11/2018</a:t>
+              <a:t>11/1/2018</a:t>
             </a:fld>
             <a:endParaRPr lang="en-US"/>
           </a:p>
@@ -1010,7 +1012,7 @@
           <a:p>
             <a:fld id="{11D67388-0790-496E-9A12-37055489AF4F}" type="datetimeFigureOut">
               <a:rPr lang="en-US" smtClean="0"/>
-              <a:t>10/11/2018</a:t>
+              <a:t>11/1/2018</a:t>
             </a:fld>
             <a:endParaRPr lang="en-US"/>
           </a:p>
@@ -1242,7 +1244,7 @@
           <a:p>
             <a:fld id="{11D67388-0790-496E-9A12-37055489AF4F}" type="datetimeFigureOut">
               <a:rPr lang="en-US" smtClean="0"/>
-              <a:t>10/11/2018</a:t>
+              <a:t>11/1/2018</a:t>
             </a:fld>
             <a:endParaRPr lang="en-US"/>
           </a:p>
@@ -1609,7 +1611,7 @@
           <a:p>
             <a:fld id="{11D67388-0790-496E-9A12-37055489AF4F}" type="datetimeFigureOut">
               <a:rPr lang="en-US" smtClean="0"/>
-              <a:t>10/11/2018</a:t>
+              <a:t>11/1/2018</a:t>
             </a:fld>
             <a:endParaRPr lang="en-US"/>
           </a:p>
@@ -1727,7 +1729,7 @@
           <a:p>
             <a:fld id="{11D67388-0790-496E-9A12-37055489AF4F}" type="datetimeFigureOut">
               <a:rPr lang="en-US" smtClean="0"/>
-              <a:t>10/11/2018</a:t>
+              <a:t>11/1/2018</a:t>
             </a:fld>
             <a:endParaRPr lang="en-US"/>
           </a:p>
@@ -1822,7 +1824,7 @@
           <a:p>
             <a:fld id="{11D67388-0790-496E-9A12-37055489AF4F}" type="datetimeFigureOut">
               <a:rPr lang="en-US" smtClean="0"/>
-              <a:t>10/11/2018</a:t>
+              <a:t>11/1/2018</a:t>
             </a:fld>
             <a:endParaRPr lang="en-US"/>
           </a:p>
@@ -2099,7 +2101,7 @@
           <a:p>
             <a:fld id="{11D67388-0790-496E-9A12-37055489AF4F}" type="datetimeFigureOut">
               <a:rPr lang="en-US" smtClean="0"/>
-              <a:t>10/11/2018</a:t>
+              <a:t>11/1/2018</a:t>
             </a:fld>
             <a:endParaRPr lang="en-US"/>
           </a:p>
@@ -2352,7 +2354,7 @@
           <a:p>
             <a:fld id="{11D67388-0790-496E-9A12-37055489AF4F}" type="datetimeFigureOut">
               <a:rPr lang="en-US" smtClean="0"/>
-              <a:t>10/11/2018</a:t>
+              <a:t>11/1/2018</a:t>
             </a:fld>
             <a:endParaRPr lang="en-US"/>
           </a:p>
@@ -2565,7 +2567,7 @@
           <a:p>
             <a:fld id="{11D67388-0790-496E-9A12-37055489AF4F}" type="datetimeFigureOut">
               <a:rPr lang="en-US" smtClean="0"/>
-              <a:t>10/11/2018</a:t>
+              <a:t>11/1/2018</a:t>
             </a:fld>
             <a:endParaRPr lang="en-US"/>
           </a:p>
@@ -3043,6 +3045,2843 @@
 </p:sld>
 </file>
 
+<file path=ppt/slides/slide3.xml><?xml version="1.0" encoding="utf-8"?>
+<p:sld xmlns:a="http://schemas.openxmlformats.org/drawingml/2006/main" xmlns:r="http://schemas.openxmlformats.org/officeDocument/2006/relationships" xmlns:p="http://schemas.openxmlformats.org/presentationml/2006/main">
+  <p:cSld>
+    <p:spTree>
+      <p:nvGrpSpPr>
+        <p:cNvPr id="1" name=""/>
+        <p:cNvGrpSpPr/>
+        <p:nvPr/>
+      </p:nvGrpSpPr>
+      <p:grpSpPr>
+        <a:xfrm>
+          <a:off x="0" y="0"/>
+          <a:ext cx="0" cy="0"/>
+          <a:chOff x="0" y="0"/>
+          <a:chExt cx="0" cy="0"/>
+        </a:xfrm>
+      </p:grpSpPr>
+      <p:sp>
+        <p:nvSpPr>
+          <p:cNvPr id="4" name="Rounded Rectangle 3"/>
+          <p:cNvSpPr/>
+          <p:nvPr/>
+        </p:nvSpPr>
+        <p:spPr>
+          <a:xfrm>
+            <a:off x="2962657" y="2131834"/>
+            <a:ext cx="1536192" cy="675206"/>
+          </a:xfrm>
+          <a:prstGeom prst="roundRect">
+            <a:avLst/>
+          </a:prstGeom>
+          <a:solidFill>
+            <a:schemeClr val="accent4">
+              <a:lumMod val="20000"/>
+              <a:lumOff val="80000"/>
+            </a:schemeClr>
+          </a:solidFill>
+        </p:spPr>
+        <p:style>
+          <a:lnRef idx="2">
+            <a:schemeClr val="accent1">
+              <a:shade val="50000"/>
+            </a:schemeClr>
+          </a:lnRef>
+          <a:fillRef idx="1">
+            <a:schemeClr val="accent1"/>
+          </a:fillRef>
+          <a:effectRef idx="0">
+            <a:schemeClr val="accent1"/>
+          </a:effectRef>
+          <a:fontRef idx="minor">
+            <a:schemeClr val="lt1"/>
+          </a:fontRef>
+        </p:style>
+        <p:txBody>
+          <a:bodyPr rtlCol="0" anchor="ctr"/>
+          <a:lstStyle/>
+          <a:p>
+            <a:pPr algn="ctr"/>
+            <a:r>
+              <a:rPr lang="en-US" dirty="0" smtClean="0">
+                <a:solidFill>
+                  <a:schemeClr val="tx1"/>
+                </a:solidFill>
+              </a:rPr>
+              <a:t>SRN</a:t>
+            </a:r>
+          </a:p>
+          <a:p>
+            <a:pPr algn="ctr"/>
+            <a:r>
+              <a:rPr lang="en-US" dirty="0" smtClean="0">
+                <a:solidFill>
+                  <a:schemeClr val="tx1"/>
+                </a:solidFill>
+              </a:rPr>
+              <a:t>Phase 1</a:t>
+            </a:r>
+            <a:endParaRPr lang="en-US" dirty="0">
+              <a:solidFill>
+                <a:schemeClr val="tx1"/>
+              </a:solidFill>
+            </a:endParaRPr>
+          </a:p>
+        </p:txBody>
+      </p:sp>
+      <p:sp>
+        <p:nvSpPr>
+          <p:cNvPr id="5" name="Rounded Rectangle 4"/>
+          <p:cNvSpPr/>
+          <p:nvPr/>
+        </p:nvSpPr>
+        <p:spPr>
+          <a:xfrm>
+            <a:off x="7266433" y="2131834"/>
+            <a:ext cx="1536192" cy="675206"/>
+          </a:xfrm>
+          <a:prstGeom prst="roundRect">
+            <a:avLst/>
+          </a:prstGeom>
+          <a:solidFill>
+            <a:schemeClr val="accent2">
+              <a:lumMod val="40000"/>
+              <a:lumOff val="60000"/>
+            </a:schemeClr>
+          </a:solidFill>
+        </p:spPr>
+        <p:style>
+          <a:lnRef idx="2">
+            <a:schemeClr val="accent1">
+              <a:shade val="50000"/>
+            </a:schemeClr>
+          </a:lnRef>
+          <a:fillRef idx="1">
+            <a:schemeClr val="accent1"/>
+          </a:fillRef>
+          <a:effectRef idx="0">
+            <a:schemeClr val="accent1"/>
+          </a:effectRef>
+          <a:fontRef idx="minor">
+            <a:schemeClr val="lt1"/>
+          </a:fontRef>
+        </p:style>
+        <p:txBody>
+          <a:bodyPr rtlCol="0" anchor="ctr"/>
+          <a:lstStyle/>
+          <a:p>
+            <a:pPr algn="ctr"/>
+            <a:r>
+              <a:rPr lang="en-US" dirty="0" smtClean="0">
+                <a:solidFill>
+                  <a:schemeClr val="tx1"/>
+                </a:solidFill>
+              </a:rPr>
+              <a:t>SRN</a:t>
+            </a:r>
+          </a:p>
+          <a:p>
+            <a:pPr algn="ctr"/>
+            <a:r>
+              <a:rPr lang="en-US" dirty="0" smtClean="0">
+                <a:solidFill>
+                  <a:schemeClr val="tx1"/>
+                </a:solidFill>
+              </a:rPr>
+              <a:t>Phase 2</a:t>
+            </a:r>
+            <a:endParaRPr lang="en-US" dirty="0">
+              <a:solidFill>
+                <a:schemeClr val="tx1"/>
+              </a:solidFill>
+            </a:endParaRPr>
+          </a:p>
+        </p:txBody>
+      </p:sp>
+      <p:sp>
+        <p:nvSpPr>
+          <p:cNvPr id="6" name="Rounded Rectangle 5"/>
+          <p:cNvSpPr/>
+          <p:nvPr/>
+        </p:nvSpPr>
+        <p:spPr>
+          <a:xfrm>
+            <a:off x="2876325" y="3034750"/>
+            <a:ext cx="1708855" cy="1061649"/>
+          </a:xfrm>
+          <a:prstGeom prst="roundRect">
+            <a:avLst/>
+          </a:prstGeom>
+          <a:noFill/>
+          <a:ln>
+            <a:noFill/>
+          </a:ln>
+        </p:spPr>
+        <p:style>
+          <a:lnRef idx="2">
+            <a:schemeClr val="accent1">
+              <a:shade val="50000"/>
+            </a:schemeClr>
+          </a:lnRef>
+          <a:fillRef idx="1">
+            <a:schemeClr val="accent1"/>
+          </a:fillRef>
+          <a:effectRef idx="0">
+            <a:schemeClr val="accent1"/>
+          </a:effectRef>
+          <a:fontRef idx="minor">
+            <a:schemeClr val="lt1"/>
+          </a:fontRef>
+        </p:style>
+        <p:txBody>
+          <a:bodyPr rtlCol="0" anchor="ctr"/>
+          <a:lstStyle/>
+          <a:p>
+            <a:pPr algn="ctr"/>
+            <a:r>
+              <a:rPr lang="en-US" dirty="0" smtClean="0">
+                <a:solidFill>
+                  <a:schemeClr val="tx1"/>
+                </a:solidFill>
+              </a:rPr>
+              <a:t>WEL accounting by sub-region</a:t>
+            </a:r>
+            <a:endParaRPr lang="en-US" dirty="0">
+              <a:solidFill>
+                <a:schemeClr val="tx1"/>
+              </a:solidFill>
+            </a:endParaRPr>
+          </a:p>
+        </p:txBody>
+      </p:sp>
+      <p:sp>
+        <p:nvSpPr>
+          <p:cNvPr id="7" name="Rounded Rectangle 6"/>
+          <p:cNvSpPr/>
+          <p:nvPr/>
+        </p:nvSpPr>
+        <p:spPr>
+          <a:xfrm>
+            <a:off x="7180101" y="3025718"/>
+            <a:ext cx="1708855" cy="1061649"/>
+          </a:xfrm>
+          <a:prstGeom prst="roundRect">
+            <a:avLst/>
+          </a:prstGeom>
+          <a:noFill/>
+          <a:ln>
+            <a:noFill/>
+          </a:ln>
+        </p:spPr>
+        <p:style>
+          <a:lnRef idx="2">
+            <a:schemeClr val="accent1">
+              <a:shade val="50000"/>
+            </a:schemeClr>
+          </a:lnRef>
+          <a:fillRef idx="1">
+            <a:schemeClr val="accent1"/>
+          </a:fillRef>
+          <a:effectRef idx="0">
+            <a:schemeClr val="accent1"/>
+          </a:effectRef>
+          <a:fontRef idx="minor">
+            <a:schemeClr val="lt1"/>
+          </a:fontRef>
+        </p:style>
+        <p:txBody>
+          <a:bodyPr rtlCol="0" anchor="ctr"/>
+          <a:lstStyle/>
+          <a:p>
+            <a:pPr algn="ctr"/>
+            <a:r>
+              <a:rPr lang="en-US" dirty="0" smtClean="0">
+                <a:solidFill>
+                  <a:schemeClr val="tx1"/>
+                </a:solidFill>
+              </a:rPr>
+              <a:t>WEL </a:t>
+            </a:r>
+          </a:p>
+          <a:p>
+            <a:pPr algn="ctr"/>
+            <a:r>
+              <a:rPr lang="en-US" dirty="0" smtClean="0">
+                <a:solidFill>
+                  <a:schemeClr val="tx1"/>
+                </a:solidFill>
+              </a:rPr>
+              <a:t>inter-sectoral dynamics</a:t>
+            </a:r>
+            <a:endParaRPr lang="en-US" dirty="0">
+              <a:solidFill>
+                <a:schemeClr val="tx1"/>
+              </a:solidFill>
+            </a:endParaRPr>
+          </a:p>
+        </p:txBody>
+      </p:sp>
+    </p:spTree>
+    <p:extLst>
+      <p:ext uri="{BB962C8B-B14F-4D97-AF65-F5344CB8AC3E}">
+        <p14:creationId xmlns:p14="http://schemas.microsoft.com/office/powerpoint/2010/main" val="3072357493"/>
+      </p:ext>
+    </p:extLst>
+  </p:cSld>
+  <p:clrMapOvr>
+    <a:masterClrMapping/>
+  </p:clrMapOvr>
+</p:sld>
+</file>
+
+<file path=ppt/slides/slide4.xml><?xml version="1.0" encoding="utf-8"?>
+<p:sld xmlns:a="http://schemas.openxmlformats.org/drawingml/2006/main" xmlns:r="http://schemas.openxmlformats.org/officeDocument/2006/relationships" xmlns:p="http://schemas.openxmlformats.org/presentationml/2006/main">
+  <p:cSld>
+    <p:spTree>
+      <p:nvGrpSpPr>
+        <p:cNvPr id="1" name=""/>
+        <p:cNvGrpSpPr/>
+        <p:nvPr/>
+      </p:nvGrpSpPr>
+      <p:grpSpPr>
+        <a:xfrm>
+          <a:off x="0" y="0"/>
+          <a:ext cx="0" cy="0"/>
+          <a:chOff x="0" y="0"/>
+          <a:chExt cx="0" cy="0"/>
+        </a:xfrm>
+      </p:grpSpPr>
+      <p:sp>
+        <p:nvSpPr>
+          <p:cNvPr id="4" name="Rounded Rectangle 3"/>
+          <p:cNvSpPr/>
+          <p:nvPr/>
+        </p:nvSpPr>
+        <p:spPr>
+          <a:xfrm>
+            <a:off x="4392013" y="1305229"/>
+            <a:ext cx="1691097" cy="304527"/>
+          </a:xfrm>
+          <a:prstGeom prst="roundRect">
+            <a:avLst/>
+          </a:prstGeom>
+          <a:solidFill>
+            <a:schemeClr val="accent4">
+              <a:lumMod val="20000"/>
+              <a:lumOff val="80000"/>
+            </a:schemeClr>
+          </a:solidFill>
+        </p:spPr>
+        <p:style>
+          <a:lnRef idx="2">
+            <a:schemeClr val="accent1">
+              <a:shade val="50000"/>
+            </a:schemeClr>
+          </a:lnRef>
+          <a:fillRef idx="1">
+            <a:schemeClr val="accent1"/>
+          </a:fillRef>
+          <a:effectRef idx="0">
+            <a:schemeClr val="accent1"/>
+          </a:effectRef>
+          <a:fontRef idx="minor">
+            <a:schemeClr val="lt1"/>
+          </a:fontRef>
+        </p:style>
+        <p:txBody>
+          <a:bodyPr rtlCol="0" anchor="ctr"/>
+          <a:lstStyle/>
+          <a:p>
+            <a:pPr algn="ctr"/>
+            <a:r>
+              <a:rPr lang="en-US" dirty="0" err="1" smtClean="0">
+                <a:solidFill>
+                  <a:schemeClr val="tx1"/>
+                </a:solidFill>
+              </a:rPr>
+              <a:t>srn.readgcam.R</a:t>
+            </a:r>
+            <a:endParaRPr lang="en-US" dirty="0">
+              <a:solidFill>
+                <a:schemeClr val="tx1"/>
+              </a:solidFill>
+            </a:endParaRPr>
+          </a:p>
+        </p:txBody>
+      </p:sp>
+      <p:sp>
+        <p:nvSpPr>
+          <p:cNvPr id="5" name="Rounded Rectangle 4"/>
+          <p:cNvSpPr/>
+          <p:nvPr/>
+        </p:nvSpPr>
+        <p:spPr>
+          <a:xfrm>
+            <a:off x="4392013" y="2444830"/>
+            <a:ext cx="1691097" cy="304527"/>
+          </a:xfrm>
+          <a:prstGeom prst="roundRect">
+            <a:avLst/>
+          </a:prstGeom>
+          <a:solidFill>
+            <a:schemeClr val="accent4">
+              <a:lumMod val="20000"/>
+              <a:lumOff val="80000"/>
+            </a:schemeClr>
+          </a:solidFill>
+        </p:spPr>
+        <p:style>
+          <a:lnRef idx="2">
+            <a:schemeClr val="accent1">
+              <a:shade val="50000"/>
+            </a:schemeClr>
+          </a:lnRef>
+          <a:fillRef idx="1">
+            <a:schemeClr val="accent1"/>
+          </a:fillRef>
+          <a:effectRef idx="0">
+            <a:schemeClr val="accent1"/>
+          </a:effectRef>
+          <a:fontRef idx="minor">
+            <a:schemeClr val="lt1"/>
+          </a:fontRef>
+        </p:style>
+        <p:txBody>
+          <a:bodyPr rtlCol="0" anchor="ctr"/>
+          <a:lstStyle/>
+          <a:p>
+            <a:pPr algn="ctr"/>
+            <a:r>
+              <a:rPr lang="en-US" dirty="0" err="1" smtClean="0">
+                <a:solidFill>
+                  <a:schemeClr val="tx1"/>
+                </a:solidFill>
+              </a:rPr>
+              <a:t>srn.chart.R</a:t>
+            </a:r>
+            <a:endParaRPr lang="en-US" dirty="0">
+              <a:solidFill>
+                <a:schemeClr val="tx1"/>
+              </a:solidFill>
+            </a:endParaRPr>
+          </a:p>
+        </p:txBody>
+      </p:sp>
+      <p:sp>
+        <p:nvSpPr>
+          <p:cNvPr id="6" name="Rounded Rectangle 5"/>
+          <p:cNvSpPr/>
+          <p:nvPr/>
+        </p:nvSpPr>
+        <p:spPr>
+          <a:xfrm>
+            <a:off x="4392013" y="3953743"/>
+            <a:ext cx="1691097" cy="304527"/>
+          </a:xfrm>
+          <a:prstGeom prst="roundRect">
+            <a:avLst/>
+          </a:prstGeom>
+          <a:solidFill>
+            <a:schemeClr val="accent4">
+              <a:lumMod val="20000"/>
+              <a:lumOff val="80000"/>
+            </a:schemeClr>
+          </a:solidFill>
+        </p:spPr>
+        <p:style>
+          <a:lnRef idx="2">
+            <a:schemeClr val="accent1">
+              <a:shade val="50000"/>
+            </a:schemeClr>
+          </a:lnRef>
+          <a:fillRef idx="1">
+            <a:schemeClr val="accent1"/>
+          </a:fillRef>
+          <a:effectRef idx="0">
+            <a:schemeClr val="accent1"/>
+          </a:effectRef>
+          <a:fontRef idx="minor">
+            <a:schemeClr val="lt1"/>
+          </a:fontRef>
+        </p:style>
+        <p:txBody>
+          <a:bodyPr rtlCol="0" anchor="ctr"/>
+          <a:lstStyle/>
+          <a:p>
+            <a:pPr algn="ctr"/>
+            <a:r>
+              <a:rPr lang="en-US" dirty="0" smtClean="0">
+                <a:solidFill>
+                  <a:schemeClr val="tx1"/>
+                </a:solidFill>
+              </a:rPr>
+              <a:t>srn.grid2poly.R</a:t>
+            </a:r>
+            <a:endParaRPr lang="en-US" dirty="0">
+              <a:solidFill>
+                <a:schemeClr val="tx1"/>
+              </a:solidFill>
+            </a:endParaRPr>
+          </a:p>
+        </p:txBody>
+      </p:sp>
+      <p:sp>
+        <p:nvSpPr>
+          <p:cNvPr id="7" name="Rounded Rectangle 6"/>
+          <p:cNvSpPr/>
+          <p:nvPr/>
+        </p:nvSpPr>
+        <p:spPr>
+          <a:xfrm>
+            <a:off x="4393424" y="5874025"/>
+            <a:ext cx="1691097" cy="304527"/>
+          </a:xfrm>
+          <a:prstGeom prst="roundRect">
+            <a:avLst/>
+          </a:prstGeom>
+          <a:solidFill>
+            <a:schemeClr val="accent4">
+              <a:lumMod val="20000"/>
+              <a:lumOff val="80000"/>
+            </a:schemeClr>
+          </a:solidFill>
+        </p:spPr>
+        <p:style>
+          <a:lnRef idx="2">
+            <a:schemeClr val="accent1">
+              <a:shade val="50000"/>
+            </a:schemeClr>
+          </a:lnRef>
+          <a:fillRef idx="1">
+            <a:schemeClr val="accent1"/>
+          </a:fillRef>
+          <a:effectRef idx="0">
+            <a:schemeClr val="accent1"/>
+          </a:effectRef>
+          <a:fontRef idx="minor">
+            <a:schemeClr val="lt1"/>
+          </a:fontRef>
+        </p:style>
+        <p:txBody>
+          <a:bodyPr rtlCol="0" anchor="ctr"/>
+          <a:lstStyle/>
+          <a:p>
+            <a:pPr algn="ctr"/>
+            <a:r>
+              <a:rPr lang="en-US" dirty="0" err="1" smtClean="0">
+                <a:solidFill>
+                  <a:schemeClr val="tx1"/>
+                </a:solidFill>
+              </a:rPr>
+              <a:t>srn.maps.R</a:t>
+            </a:r>
+            <a:endParaRPr lang="en-US" dirty="0">
+              <a:solidFill>
+                <a:schemeClr val="tx1"/>
+              </a:solidFill>
+            </a:endParaRPr>
+          </a:p>
+        </p:txBody>
+      </p:sp>
+      <p:sp>
+        <p:nvSpPr>
+          <p:cNvPr id="10" name="Rounded Rectangle 9"/>
+          <p:cNvSpPr/>
+          <p:nvPr/>
+        </p:nvSpPr>
+        <p:spPr>
+          <a:xfrm>
+            <a:off x="4471417" y="175130"/>
+            <a:ext cx="1536192" cy="675206"/>
+          </a:xfrm>
+          <a:prstGeom prst="roundRect">
+            <a:avLst/>
+          </a:prstGeom>
+          <a:solidFill>
+            <a:schemeClr val="accent4">
+              <a:lumMod val="20000"/>
+              <a:lumOff val="80000"/>
+            </a:schemeClr>
+          </a:solidFill>
+        </p:spPr>
+        <p:style>
+          <a:lnRef idx="2">
+            <a:schemeClr val="accent1">
+              <a:shade val="50000"/>
+            </a:schemeClr>
+          </a:lnRef>
+          <a:fillRef idx="1">
+            <a:schemeClr val="accent1"/>
+          </a:fillRef>
+          <a:effectRef idx="0">
+            <a:schemeClr val="accent1"/>
+          </a:effectRef>
+          <a:fontRef idx="minor">
+            <a:schemeClr val="lt1"/>
+          </a:fontRef>
+        </p:style>
+        <p:txBody>
+          <a:bodyPr rtlCol="0" anchor="ctr"/>
+          <a:lstStyle/>
+          <a:p>
+            <a:pPr algn="ctr"/>
+            <a:r>
+              <a:rPr lang="en-US" dirty="0" smtClean="0">
+                <a:solidFill>
+                  <a:schemeClr val="tx1"/>
+                </a:solidFill>
+              </a:rPr>
+              <a:t>SRN</a:t>
+            </a:r>
+          </a:p>
+          <a:p>
+            <a:pPr algn="ctr"/>
+            <a:r>
+              <a:rPr lang="en-US" dirty="0" smtClean="0">
+                <a:solidFill>
+                  <a:schemeClr val="tx1"/>
+                </a:solidFill>
+              </a:rPr>
+              <a:t>Phase 1</a:t>
+            </a:r>
+            <a:endParaRPr lang="en-US" dirty="0">
+              <a:solidFill>
+                <a:schemeClr val="tx1"/>
+              </a:solidFill>
+            </a:endParaRPr>
+          </a:p>
+        </p:txBody>
+      </p:sp>
+      <p:sp>
+        <p:nvSpPr>
+          <p:cNvPr id="11" name="Rounded Rectangle 10"/>
+          <p:cNvSpPr/>
+          <p:nvPr/>
+        </p:nvSpPr>
+        <p:spPr>
+          <a:xfrm>
+            <a:off x="1427244" y="940887"/>
+            <a:ext cx="1708855" cy="304528"/>
+          </a:xfrm>
+          <a:prstGeom prst="roundRect">
+            <a:avLst/>
+          </a:prstGeom>
+          <a:solidFill>
+            <a:schemeClr val="accent6">
+              <a:lumMod val="20000"/>
+              <a:lumOff val="80000"/>
+            </a:schemeClr>
+          </a:solidFill>
+        </p:spPr>
+        <p:style>
+          <a:lnRef idx="2">
+            <a:schemeClr val="accent1">
+              <a:shade val="50000"/>
+            </a:schemeClr>
+          </a:lnRef>
+          <a:fillRef idx="1">
+            <a:schemeClr val="accent1"/>
+          </a:fillRef>
+          <a:effectRef idx="0">
+            <a:schemeClr val="accent1"/>
+          </a:effectRef>
+          <a:fontRef idx="minor">
+            <a:schemeClr val="lt1"/>
+          </a:fontRef>
+        </p:style>
+        <p:txBody>
+          <a:bodyPr rtlCol="0" anchor="ctr"/>
+          <a:lstStyle/>
+          <a:p>
+            <a:pPr algn="ctr"/>
+            <a:r>
+              <a:rPr lang="en-US" dirty="0" smtClean="0">
+                <a:solidFill>
+                  <a:schemeClr val="tx1"/>
+                </a:solidFill>
+              </a:rPr>
+              <a:t>GCAM database </a:t>
+            </a:r>
+            <a:endParaRPr lang="en-US" dirty="0">
+              <a:solidFill>
+                <a:schemeClr val="tx1"/>
+              </a:solidFill>
+            </a:endParaRPr>
+          </a:p>
+        </p:txBody>
+      </p:sp>
+      <p:grpSp>
+        <p:nvGrpSpPr>
+          <p:cNvPr id="39" name="Group 38"/>
+          <p:cNvGrpSpPr/>
+          <p:nvPr/>
+        </p:nvGrpSpPr>
+        <p:grpSpPr>
+          <a:xfrm>
+            <a:off x="6797010" y="2166022"/>
+            <a:ext cx="5110739" cy="1441563"/>
+            <a:chOff x="5980933" y="1955276"/>
+            <a:chExt cx="5110739" cy="1441563"/>
+          </a:xfrm>
+        </p:grpSpPr>
+        <p:grpSp>
+          <p:nvGrpSpPr>
+            <p:cNvPr id="27" name="Group 26"/>
+            <p:cNvGrpSpPr>
+              <a:grpSpLocks noChangeAspect="1"/>
+            </p:cNvGrpSpPr>
+            <p:nvPr/>
+          </p:nvGrpSpPr>
+          <p:grpSpPr>
+            <a:xfrm>
+              <a:off x="5980933" y="1955276"/>
+              <a:ext cx="5110739" cy="1441563"/>
+              <a:chOff x="5870448" y="348048"/>
+              <a:chExt cx="5110739" cy="1441563"/>
+            </a:xfrm>
+          </p:grpSpPr>
+          <p:sp>
+            <p:nvSpPr>
+              <p:cNvPr id="28" name="Rounded Rectangle 27"/>
+              <p:cNvSpPr/>
+              <p:nvPr/>
+            </p:nvSpPr>
+            <p:spPr>
+              <a:xfrm>
+                <a:off x="5870448" y="512763"/>
+                <a:ext cx="5110739" cy="1276848"/>
+              </a:xfrm>
+              <a:prstGeom prst="roundRect">
+                <a:avLst/>
+              </a:prstGeom>
+              <a:solidFill>
+                <a:schemeClr val="accent5">
+                  <a:lumMod val="20000"/>
+                  <a:lumOff val="80000"/>
+                </a:schemeClr>
+              </a:solidFill>
+            </p:spPr>
+            <p:style>
+              <a:lnRef idx="2">
+                <a:schemeClr val="accent1">
+                  <a:shade val="50000"/>
+                </a:schemeClr>
+              </a:lnRef>
+              <a:fillRef idx="1">
+                <a:schemeClr val="accent1"/>
+              </a:fillRef>
+              <a:effectRef idx="0">
+                <a:schemeClr val="accent1"/>
+              </a:effectRef>
+              <a:fontRef idx="minor">
+                <a:schemeClr val="lt1"/>
+              </a:fontRef>
+            </p:style>
+            <p:txBody>
+              <a:bodyPr rtlCol="0" anchor="ctr"/>
+              <a:lstStyle/>
+              <a:p>
+                <a:pPr algn="ctr"/>
+                <a:endParaRPr lang="en-US"/>
+              </a:p>
+            </p:txBody>
+          </p:sp>
+          <p:sp>
+            <p:nvSpPr>
+              <p:cNvPr id="29" name="Rounded Rectangle 28"/>
+              <p:cNvSpPr/>
+              <p:nvPr/>
+            </p:nvSpPr>
+            <p:spPr>
+              <a:xfrm>
+                <a:off x="8097448" y="348048"/>
+                <a:ext cx="802286" cy="518785"/>
+              </a:xfrm>
+              <a:prstGeom prst="roundRect">
+                <a:avLst/>
+              </a:prstGeom>
+              <a:noFill/>
+              <a:ln>
+                <a:noFill/>
+              </a:ln>
+            </p:spPr>
+            <p:style>
+              <a:lnRef idx="2">
+                <a:schemeClr val="accent1">
+                  <a:shade val="50000"/>
+                </a:schemeClr>
+              </a:lnRef>
+              <a:fillRef idx="1">
+                <a:schemeClr val="accent1"/>
+              </a:fillRef>
+              <a:effectRef idx="0">
+                <a:schemeClr val="accent1"/>
+              </a:effectRef>
+              <a:fontRef idx="minor">
+                <a:schemeClr val="lt1"/>
+              </a:fontRef>
+            </p:style>
+            <p:txBody>
+              <a:bodyPr rtlCol="0" anchor="ctr"/>
+              <a:lstStyle/>
+              <a:p>
+                <a:r>
+                  <a:rPr lang="en-US" sz="1600" u="sng" dirty="0" smtClean="0">
+                    <a:solidFill>
+                      <a:schemeClr val="tx1"/>
+                    </a:solidFill>
+                  </a:rPr>
+                  <a:t>Charts</a:t>
+                </a:r>
+                <a:endParaRPr lang="en-US" sz="1600" dirty="0">
+                  <a:solidFill>
+                    <a:schemeClr val="tx1"/>
+                  </a:solidFill>
+                </a:endParaRPr>
+              </a:p>
+            </p:txBody>
+          </p:sp>
+        </p:grpSp>
+        <p:pic>
+          <p:nvPicPr>
+            <p:cNvPr id="34" name="Picture 33"/>
+            <p:cNvPicPr>
+              <a:picLocks noChangeAspect="1"/>
+            </p:cNvPicPr>
+            <p:nvPr/>
+          </p:nvPicPr>
+          <p:blipFill>
+            <a:blip r:embed="rId2"/>
+            <a:stretch>
+              <a:fillRect/>
+            </a:stretch>
+          </p:blipFill>
+          <p:spPr>
+            <a:xfrm>
+              <a:off x="8898988" y="2379420"/>
+              <a:ext cx="2051833" cy="908648"/>
+            </a:xfrm>
+            <a:prstGeom prst="rect">
+              <a:avLst/>
+            </a:prstGeom>
+          </p:spPr>
+        </p:pic>
+        <p:pic>
+          <p:nvPicPr>
+            <p:cNvPr id="37" name="Picture 36"/>
+            <p:cNvPicPr>
+              <a:picLocks noChangeAspect="1"/>
+            </p:cNvPicPr>
+            <p:nvPr/>
+          </p:nvPicPr>
+          <p:blipFill>
+            <a:blip r:embed="rId3"/>
+            <a:stretch>
+              <a:fillRect/>
+            </a:stretch>
+          </p:blipFill>
+          <p:spPr>
+            <a:xfrm>
+              <a:off x="6136636" y="2380000"/>
+              <a:ext cx="1206898" cy="908069"/>
+            </a:xfrm>
+            <a:prstGeom prst="rect">
+              <a:avLst/>
+            </a:prstGeom>
+          </p:spPr>
+        </p:pic>
+        <p:pic>
+          <p:nvPicPr>
+            <p:cNvPr id="38" name="Picture 37"/>
+            <p:cNvPicPr>
+              <a:picLocks noChangeAspect="1"/>
+            </p:cNvPicPr>
+            <p:nvPr/>
+          </p:nvPicPr>
+          <p:blipFill>
+            <a:blip r:embed="rId4"/>
+            <a:stretch>
+              <a:fillRect/>
+            </a:stretch>
+          </p:blipFill>
+          <p:spPr>
+            <a:xfrm>
+              <a:off x="7508405" y="2379999"/>
+              <a:ext cx="1215416" cy="908069"/>
+            </a:xfrm>
+            <a:prstGeom prst="rect">
+              <a:avLst/>
+            </a:prstGeom>
+          </p:spPr>
+        </p:pic>
+      </p:grpSp>
+      <p:grpSp>
+        <p:nvGrpSpPr>
+          <p:cNvPr id="45" name="Group 44"/>
+          <p:cNvGrpSpPr/>
+          <p:nvPr/>
+        </p:nvGrpSpPr>
+        <p:grpSpPr>
+          <a:xfrm>
+            <a:off x="6692960" y="691115"/>
+            <a:ext cx="5232826" cy="1404084"/>
+            <a:chOff x="6025896" y="533680"/>
+            <a:chExt cx="5232826" cy="1404084"/>
+          </a:xfrm>
+        </p:grpSpPr>
+        <p:grpSp>
+          <p:nvGrpSpPr>
+            <p:cNvPr id="21" name="Group 20"/>
+            <p:cNvGrpSpPr>
+              <a:grpSpLocks noChangeAspect="1"/>
+            </p:cNvGrpSpPr>
+            <p:nvPr/>
+          </p:nvGrpSpPr>
+          <p:grpSpPr>
+            <a:xfrm>
+              <a:off x="6025896" y="533680"/>
+              <a:ext cx="5232826" cy="1404084"/>
+              <a:chOff x="6062472" y="385527"/>
+              <a:chExt cx="5232826" cy="1404084"/>
+            </a:xfrm>
+          </p:grpSpPr>
+          <p:sp>
+            <p:nvSpPr>
+              <p:cNvPr id="20" name="Rounded Rectangle 19"/>
+              <p:cNvSpPr/>
+              <p:nvPr/>
+            </p:nvSpPr>
+            <p:spPr>
+              <a:xfrm>
+                <a:off x="6062472" y="512763"/>
+                <a:ext cx="5232629" cy="1276848"/>
+              </a:xfrm>
+              <a:prstGeom prst="roundRect">
+                <a:avLst/>
+              </a:prstGeom>
+              <a:solidFill>
+                <a:schemeClr val="accent5">
+                  <a:lumMod val="20000"/>
+                  <a:lumOff val="80000"/>
+                </a:schemeClr>
+              </a:solidFill>
+            </p:spPr>
+            <p:style>
+              <a:lnRef idx="2">
+                <a:schemeClr val="accent1">
+                  <a:shade val="50000"/>
+                </a:schemeClr>
+              </a:lnRef>
+              <a:fillRef idx="1">
+                <a:schemeClr val="accent1"/>
+              </a:fillRef>
+              <a:effectRef idx="0">
+                <a:schemeClr val="accent1"/>
+              </a:effectRef>
+              <a:fontRef idx="minor">
+                <a:schemeClr val="lt1"/>
+              </a:fontRef>
+            </p:style>
+            <p:txBody>
+              <a:bodyPr rtlCol="0" anchor="ctr"/>
+              <a:lstStyle/>
+              <a:p>
+                <a:pPr algn="ctr"/>
+                <a:endParaRPr lang="en-US"/>
+              </a:p>
+            </p:txBody>
+          </p:sp>
+          <p:sp>
+            <p:nvSpPr>
+              <p:cNvPr id="14" name="Rounded Rectangle 13"/>
+              <p:cNvSpPr/>
+              <p:nvPr/>
+            </p:nvSpPr>
+            <p:spPr>
+              <a:xfrm>
+                <a:off x="7501074" y="385527"/>
+                <a:ext cx="1927996" cy="518785"/>
+              </a:xfrm>
+              <a:prstGeom prst="roundRect">
+                <a:avLst/>
+              </a:prstGeom>
+              <a:noFill/>
+              <a:ln>
+                <a:noFill/>
+              </a:ln>
+            </p:spPr>
+            <p:style>
+              <a:lnRef idx="2">
+                <a:schemeClr val="accent1">
+                  <a:shade val="50000"/>
+                </a:schemeClr>
+              </a:lnRef>
+              <a:fillRef idx="1">
+                <a:schemeClr val="accent1"/>
+              </a:fillRef>
+              <a:effectRef idx="0">
+                <a:schemeClr val="accent1"/>
+              </a:effectRef>
+              <a:fontRef idx="minor">
+                <a:schemeClr val="lt1"/>
+              </a:fontRef>
+            </p:style>
+            <p:txBody>
+              <a:bodyPr rtlCol="0" anchor="ctr"/>
+              <a:lstStyle/>
+              <a:p>
+                <a:r>
+                  <a:rPr lang="en-US" sz="1600" u="sng" dirty="0" smtClean="0">
+                    <a:solidFill>
+                      <a:schemeClr val="tx1"/>
+                    </a:solidFill>
+                  </a:rPr>
+                  <a:t>Standardized Tables</a:t>
+                </a:r>
+                <a:endParaRPr lang="en-US" sz="1600" dirty="0">
+                  <a:solidFill>
+                    <a:schemeClr val="tx1"/>
+                  </a:solidFill>
+                </a:endParaRPr>
+              </a:p>
+            </p:txBody>
+          </p:sp>
+          <p:sp>
+            <p:nvSpPr>
+              <p:cNvPr id="17" name="Rounded Rectangle 16"/>
+              <p:cNvSpPr/>
+              <p:nvPr/>
+            </p:nvSpPr>
+            <p:spPr>
+              <a:xfrm>
+                <a:off x="6440669" y="666937"/>
+                <a:ext cx="1927996" cy="518785"/>
+              </a:xfrm>
+              <a:prstGeom prst="roundRect">
+                <a:avLst/>
+              </a:prstGeom>
+              <a:noFill/>
+              <a:ln>
+                <a:noFill/>
+              </a:ln>
+            </p:spPr>
+            <p:style>
+              <a:lnRef idx="2">
+                <a:schemeClr val="accent1">
+                  <a:shade val="50000"/>
+                </a:schemeClr>
+              </a:lnRef>
+              <a:fillRef idx="1">
+                <a:schemeClr val="accent1"/>
+              </a:fillRef>
+              <a:effectRef idx="0">
+                <a:schemeClr val="accent1"/>
+              </a:effectRef>
+              <a:fontRef idx="minor">
+                <a:schemeClr val="lt1"/>
+              </a:fontRef>
+            </p:style>
+            <p:txBody>
+              <a:bodyPr rtlCol="0" anchor="ctr"/>
+              <a:lstStyle/>
+              <a:p>
+                <a:r>
+                  <a:rPr lang="en-US" sz="1600" dirty="0" smtClean="0">
+                    <a:solidFill>
+                      <a:schemeClr val="tx1"/>
+                    </a:solidFill>
+                  </a:rPr>
+                  <a:t>1. Default Values</a:t>
+                </a:r>
+                <a:endParaRPr lang="en-US" sz="1600" dirty="0">
+                  <a:solidFill>
+                    <a:schemeClr val="tx1"/>
+                  </a:solidFill>
+                </a:endParaRPr>
+              </a:p>
+            </p:txBody>
+          </p:sp>
+          <p:sp>
+            <p:nvSpPr>
+              <p:cNvPr id="19" name="Rounded Rectangle 18"/>
+              <p:cNvSpPr/>
+              <p:nvPr/>
+            </p:nvSpPr>
+            <p:spPr>
+              <a:xfrm>
+                <a:off x="8792713" y="654656"/>
+                <a:ext cx="2502585" cy="518785"/>
+              </a:xfrm>
+              <a:prstGeom prst="roundRect">
+                <a:avLst/>
+              </a:prstGeom>
+              <a:noFill/>
+              <a:ln>
+                <a:noFill/>
+              </a:ln>
+            </p:spPr>
+            <p:style>
+              <a:lnRef idx="2">
+                <a:schemeClr val="accent1">
+                  <a:shade val="50000"/>
+                </a:schemeClr>
+              </a:lnRef>
+              <a:fillRef idx="1">
+                <a:schemeClr val="accent1"/>
+              </a:fillRef>
+              <a:effectRef idx="0">
+                <a:schemeClr val="accent1"/>
+              </a:effectRef>
+              <a:fontRef idx="minor">
+                <a:schemeClr val="lt1"/>
+              </a:fontRef>
+            </p:style>
+            <p:txBody>
+              <a:bodyPr rtlCol="0" anchor="ctr"/>
+              <a:lstStyle/>
+              <a:p>
+                <a:r>
+                  <a:rPr lang="en-US" sz="1600" dirty="0" smtClean="0">
+                    <a:solidFill>
+                      <a:schemeClr val="tx1"/>
+                    </a:solidFill>
+                  </a:rPr>
+                  <a:t>2. Blank Template for users</a:t>
+                </a:r>
+                <a:endParaRPr lang="en-US" sz="1600" dirty="0">
+                  <a:solidFill>
+                    <a:schemeClr val="tx1"/>
+                  </a:solidFill>
+                </a:endParaRPr>
+              </a:p>
+            </p:txBody>
+          </p:sp>
+        </p:grpSp>
+        <p:pic>
+          <p:nvPicPr>
+            <p:cNvPr id="42" name="Picture 41"/>
+            <p:cNvPicPr>
+              <a:picLocks noChangeAspect="1"/>
+            </p:cNvPicPr>
+            <p:nvPr/>
+          </p:nvPicPr>
+          <p:blipFill>
+            <a:blip r:embed="rId5"/>
+            <a:stretch>
+              <a:fillRect/>
+            </a:stretch>
+          </p:blipFill>
+          <p:spPr>
+            <a:xfrm>
+              <a:off x="6118007" y="1202417"/>
+              <a:ext cx="2372326" cy="638524"/>
+            </a:xfrm>
+            <a:prstGeom prst="rect">
+              <a:avLst/>
+            </a:prstGeom>
+          </p:spPr>
+        </p:pic>
+        <p:pic>
+          <p:nvPicPr>
+            <p:cNvPr id="44" name="Picture 43"/>
+            <p:cNvPicPr>
+              <a:picLocks noChangeAspect="1"/>
+            </p:cNvPicPr>
+            <p:nvPr/>
+          </p:nvPicPr>
+          <p:blipFill>
+            <a:blip r:embed="rId5"/>
+            <a:stretch>
+              <a:fillRect/>
+            </a:stretch>
+          </p:blipFill>
+          <p:spPr>
+            <a:xfrm>
+              <a:off x="8821266" y="1196417"/>
+              <a:ext cx="2372326" cy="638524"/>
+            </a:xfrm>
+            <a:prstGeom prst="rect">
+              <a:avLst/>
+            </a:prstGeom>
+          </p:spPr>
+        </p:pic>
+      </p:grpSp>
+      <p:grpSp>
+        <p:nvGrpSpPr>
+          <p:cNvPr id="47" name="Group 46"/>
+          <p:cNvGrpSpPr/>
+          <p:nvPr/>
+        </p:nvGrpSpPr>
+        <p:grpSpPr>
+          <a:xfrm>
+            <a:off x="861716" y="1508265"/>
+            <a:ext cx="2693273" cy="1076986"/>
+            <a:chOff x="296232" y="1234871"/>
+            <a:chExt cx="2693273" cy="1076986"/>
+          </a:xfrm>
+        </p:grpSpPr>
+        <p:grpSp>
+          <p:nvGrpSpPr>
+            <p:cNvPr id="25" name="Group 24"/>
+            <p:cNvGrpSpPr>
+              <a:grpSpLocks noChangeAspect="1"/>
+            </p:cNvGrpSpPr>
+            <p:nvPr/>
+          </p:nvGrpSpPr>
+          <p:grpSpPr>
+            <a:xfrm>
+              <a:off x="296232" y="1234871"/>
+              <a:ext cx="2693273" cy="1076986"/>
+              <a:chOff x="122496" y="1483334"/>
+              <a:chExt cx="2693273" cy="1076986"/>
+            </a:xfrm>
+          </p:grpSpPr>
+          <p:sp>
+            <p:nvSpPr>
+              <p:cNvPr id="24" name="Rounded Rectangle 23"/>
+              <p:cNvSpPr/>
+              <p:nvPr/>
+            </p:nvSpPr>
+            <p:spPr>
+              <a:xfrm>
+                <a:off x="122496" y="1618488"/>
+                <a:ext cx="2643693" cy="941832"/>
+              </a:xfrm>
+              <a:prstGeom prst="roundRect">
+                <a:avLst/>
+              </a:prstGeom>
+              <a:solidFill>
+                <a:schemeClr val="accent6">
+                  <a:lumMod val="20000"/>
+                  <a:lumOff val="80000"/>
+                </a:schemeClr>
+              </a:solidFill>
+            </p:spPr>
+            <p:style>
+              <a:lnRef idx="2">
+                <a:schemeClr val="accent1">
+                  <a:shade val="50000"/>
+                </a:schemeClr>
+              </a:lnRef>
+              <a:fillRef idx="1">
+                <a:schemeClr val="accent1"/>
+              </a:fillRef>
+              <a:effectRef idx="0">
+                <a:schemeClr val="accent1"/>
+              </a:effectRef>
+              <a:fontRef idx="minor">
+                <a:schemeClr val="lt1"/>
+              </a:fontRef>
+            </p:style>
+            <p:txBody>
+              <a:bodyPr rtlCol="0" anchor="ctr"/>
+              <a:lstStyle/>
+              <a:p>
+                <a:pPr algn="ctr"/>
+                <a:endParaRPr lang="en-US"/>
+              </a:p>
+            </p:txBody>
+          </p:sp>
+          <p:sp>
+            <p:nvSpPr>
+              <p:cNvPr id="23" name="Rounded Rectangle 22"/>
+              <p:cNvSpPr/>
+              <p:nvPr/>
+            </p:nvSpPr>
+            <p:spPr>
+              <a:xfrm>
+                <a:off x="313184" y="1483334"/>
+                <a:ext cx="2502585" cy="518785"/>
+              </a:xfrm>
+              <a:prstGeom prst="roundRect">
+                <a:avLst/>
+              </a:prstGeom>
+              <a:noFill/>
+              <a:ln>
+                <a:noFill/>
+              </a:ln>
+            </p:spPr>
+            <p:style>
+              <a:lnRef idx="2">
+                <a:schemeClr val="accent1">
+                  <a:shade val="50000"/>
+                </a:schemeClr>
+              </a:lnRef>
+              <a:fillRef idx="1">
+                <a:schemeClr val="accent1"/>
+              </a:fillRef>
+              <a:effectRef idx="0">
+                <a:schemeClr val="accent1"/>
+              </a:effectRef>
+              <a:fontRef idx="minor">
+                <a:schemeClr val="lt1"/>
+              </a:fontRef>
+            </p:style>
+            <p:txBody>
+              <a:bodyPr rtlCol="0" anchor="ctr"/>
+              <a:lstStyle/>
+              <a:p>
+                <a:r>
+                  <a:rPr lang="en-US" sz="1600" u="sng" dirty="0" smtClean="0">
+                    <a:solidFill>
+                      <a:schemeClr val="tx1"/>
+                    </a:solidFill>
+                  </a:rPr>
+                  <a:t>Any Standardized Table</a:t>
+                </a:r>
+                <a:endParaRPr lang="en-US" sz="1600" u="sng" dirty="0">
+                  <a:solidFill>
+                    <a:schemeClr val="tx1"/>
+                  </a:solidFill>
+                </a:endParaRPr>
+              </a:p>
+            </p:txBody>
+          </p:sp>
+        </p:grpSp>
+        <p:pic>
+          <p:nvPicPr>
+            <p:cNvPr id="46" name="Picture 45"/>
+            <p:cNvPicPr>
+              <a:picLocks noChangeAspect="1"/>
+            </p:cNvPicPr>
+            <p:nvPr/>
+          </p:nvPicPr>
+          <p:blipFill>
+            <a:blip r:embed="rId5"/>
+            <a:stretch>
+              <a:fillRect/>
+            </a:stretch>
+          </p:blipFill>
+          <p:spPr>
+            <a:xfrm>
+              <a:off x="405155" y="1618502"/>
+              <a:ext cx="2372326" cy="638524"/>
+            </a:xfrm>
+            <a:prstGeom prst="rect">
+              <a:avLst/>
+            </a:prstGeom>
+          </p:spPr>
+        </p:pic>
+      </p:grpSp>
+      <p:grpSp>
+        <p:nvGrpSpPr>
+          <p:cNvPr id="52" name="Group 51"/>
+          <p:cNvGrpSpPr/>
+          <p:nvPr/>
+        </p:nvGrpSpPr>
+        <p:grpSpPr>
+          <a:xfrm>
+            <a:off x="631867" y="2825275"/>
+            <a:ext cx="3384404" cy="1437350"/>
+            <a:chOff x="37949" y="2526164"/>
+            <a:chExt cx="3384404" cy="1437350"/>
+          </a:xfrm>
+        </p:grpSpPr>
+        <p:sp>
+          <p:nvSpPr>
+            <p:cNvPr id="49" name="Rounded Rectangle 48"/>
+            <p:cNvSpPr/>
+            <p:nvPr/>
+          </p:nvSpPr>
+          <p:spPr>
+            <a:xfrm>
+              <a:off x="37949" y="2526164"/>
+              <a:ext cx="3299611" cy="1437350"/>
+            </a:xfrm>
+            <a:prstGeom prst="roundRect">
+              <a:avLst/>
+            </a:prstGeom>
+            <a:solidFill>
+              <a:schemeClr val="accent6">
+                <a:lumMod val="20000"/>
+                <a:lumOff val="80000"/>
+              </a:schemeClr>
+            </a:solidFill>
+          </p:spPr>
+          <p:style>
+            <a:lnRef idx="2">
+              <a:schemeClr val="accent1">
+                <a:shade val="50000"/>
+              </a:schemeClr>
+            </a:lnRef>
+            <a:fillRef idx="1">
+              <a:schemeClr val="accent1"/>
+            </a:fillRef>
+            <a:effectRef idx="0">
+              <a:schemeClr val="accent1"/>
+            </a:effectRef>
+            <a:fontRef idx="minor">
+              <a:schemeClr val="lt1"/>
+            </a:fontRef>
+          </p:style>
+          <p:txBody>
+            <a:bodyPr rtlCol="0" anchor="ctr"/>
+            <a:lstStyle/>
+            <a:p>
+              <a:pPr algn="ctr"/>
+              <a:endParaRPr lang="en-US"/>
+            </a:p>
+          </p:txBody>
+        </p:sp>
+        <p:pic>
+          <p:nvPicPr>
+            <p:cNvPr id="41" name="Picture 40"/>
+            <p:cNvPicPr>
+              <a:picLocks noChangeAspect="1"/>
+            </p:cNvPicPr>
+            <p:nvPr/>
+          </p:nvPicPr>
+          <p:blipFill rotWithShape="1">
+            <a:blip r:embed="rId6" cstate="print">
+              <a:extLst>
+                <a:ext uri="{28A0092B-C50C-407E-A947-70E740481C1C}">
+                  <a14:useLocalDpi xmlns:a14="http://schemas.microsoft.com/office/drawing/2010/main" val="0"/>
+                </a:ext>
+              </a:extLst>
+            </a:blip>
+            <a:srcRect l="4143" t="20175" r="33076" b="20825"/>
+            <a:stretch/>
+          </p:blipFill>
+          <p:spPr>
+            <a:xfrm>
+              <a:off x="2271392" y="2999529"/>
+              <a:ext cx="893902" cy="872374"/>
+            </a:xfrm>
+            <a:prstGeom prst="rect">
+              <a:avLst/>
+            </a:prstGeom>
+          </p:spPr>
+        </p:pic>
+        <p:pic>
+          <p:nvPicPr>
+            <p:cNvPr id="48" name="Picture 47"/>
+            <p:cNvPicPr>
+              <a:picLocks noChangeAspect="1"/>
+            </p:cNvPicPr>
+            <p:nvPr/>
+          </p:nvPicPr>
+          <p:blipFill>
+            <a:blip r:embed="rId7"/>
+            <a:stretch>
+              <a:fillRect/>
+            </a:stretch>
+          </p:blipFill>
+          <p:spPr>
+            <a:xfrm>
+              <a:off x="122048" y="3208549"/>
+              <a:ext cx="1999767" cy="546105"/>
+            </a:xfrm>
+            <a:prstGeom prst="rect">
+              <a:avLst/>
+            </a:prstGeom>
+          </p:spPr>
+        </p:pic>
+        <p:sp>
+          <p:nvSpPr>
+            <p:cNvPr id="50" name="Rounded Rectangle 49"/>
+            <p:cNvSpPr/>
+            <p:nvPr/>
+          </p:nvSpPr>
+          <p:spPr>
+            <a:xfrm>
+              <a:off x="165603" y="2650348"/>
+              <a:ext cx="1702982" cy="518785"/>
+            </a:xfrm>
+            <a:prstGeom prst="roundRect">
+              <a:avLst/>
+            </a:prstGeom>
+            <a:noFill/>
+            <a:ln>
+              <a:noFill/>
+            </a:ln>
+          </p:spPr>
+          <p:style>
+            <a:lnRef idx="2">
+              <a:schemeClr val="accent1">
+                <a:shade val="50000"/>
+              </a:schemeClr>
+            </a:lnRef>
+            <a:fillRef idx="1">
+              <a:schemeClr val="accent1"/>
+            </a:fillRef>
+            <a:effectRef idx="0">
+              <a:schemeClr val="accent1"/>
+            </a:effectRef>
+            <a:fontRef idx="minor">
+              <a:schemeClr val="lt1"/>
+            </a:fontRef>
+          </p:style>
+          <p:txBody>
+            <a:bodyPr rtlCol="0" anchor="ctr"/>
+            <a:lstStyle/>
+            <a:p>
+              <a:pPr algn="ctr"/>
+              <a:r>
+                <a:rPr lang="en-US" sz="1600" u="sng" dirty="0" smtClean="0">
+                  <a:solidFill>
+                    <a:schemeClr val="tx1"/>
+                  </a:solidFill>
+                </a:rPr>
+                <a:t>Any Standardized Grid Table</a:t>
+              </a:r>
+              <a:endParaRPr lang="en-US" sz="1600" u="sng" dirty="0">
+                <a:solidFill>
+                  <a:schemeClr val="tx1"/>
+                </a:solidFill>
+              </a:endParaRPr>
+            </a:p>
+          </p:txBody>
+        </p:sp>
+        <p:sp>
+          <p:nvSpPr>
+            <p:cNvPr id="51" name="Rounded Rectangle 50"/>
+            <p:cNvSpPr/>
+            <p:nvPr/>
+          </p:nvSpPr>
+          <p:spPr>
+            <a:xfrm>
+              <a:off x="2014332" y="2565580"/>
+              <a:ext cx="1408021" cy="518785"/>
+            </a:xfrm>
+            <a:prstGeom prst="roundRect">
+              <a:avLst/>
+            </a:prstGeom>
+            <a:noFill/>
+            <a:ln>
+              <a:noFill/>
+            </a:ln>
+          </p:spPr>
+          <p:style>
+            <a:lnRef idx="2">
+              <a:schemeClr val="accent1">
+                <a:shade val="50000"/>
+              </a:schemeClr>
+            </a:lnRef>
+            <a:fillRef idx="1">
+              <a:schemeClr val="accent1"/>
+            </a:fillRef>
+            <a:effectRef idx="0">
+              <a:schemeClr val="accent1"/>
+            </a:effectRef>
+            <a:fontRef idx="minor">
+              <a:schemeClr val="lt1"/>
+            </a:fontRef>
+          </p:style>
+          <p:txBody>
+            <a:bodyPr rtlCol="0" anchor="ctr"/>
+            <a:lstStyle/>
+            <a:p>
+              <a:pPr algn="ctr"/>
+              <a:r>
+                <a:rPr lang="en-US" sz="1600" u="sng" dirty="0" smtClean="0">
+                  <a:solidFill>
+                    <a:schemeClr val="tx1"/>
+                  </a:solidFill>
+                </a:rPr>
+                <a:t>Any Shapefile</a:t>
+              </a:r>
+              <a:endParaRPr lang="en-US" sz="1600" u="sng" dirty="0">
+                <a:solidFill>
+                  <a:schemeClr val="tx1"/>
+                </a:solidFill>
+              </a:endParaRPr>
+            </a:p>
+          </p:txBody>
+        </p:sp>
+      </p:grpSp>
+      <p:grpSp>
+        <p:nvGrpSpPr>
+          <p:cNvPr id="61" name="Group 60"/>
+          <p:cNvGrpSpPr>
+            <a:grpSpLocks noChangeAspect="1"/>
+          </p:cNvGrpSpPr>
+          <p:nvPr/>
+        </p:nvGrpSpPr>
+        <p:grpSpPr>
+          <a:xfrm>
+            <a:off x="6675120" y="3744424"/>
+            <a:ext cx="5297126" cy="1395071"/>
+            <a:chOff x="5998172" y="394540"/>
+            <a:chExt cx="5297126" cy="1395071"/>
+          </a:xfrm>
+        </p:grpSpPr>
+        <p:sp>
+          <p:nvSpPr>
+            <p:cNvPr id="64" name="Rounded Rectangle 63"/>
+            <p:cNvSpPr/>
+            <p:nvPr/>
+          </p:nvSpPr>
+          <p:spPr>
+            <a:xfrm>
+              <a:off x="5998172" y="512763"/>
+              <a:ext cx="5297126" cy="1276848"/>
+            </a:xfrm>
+            <a:prstGeom prst="roundRect">
+              <a:avLst/>
+            </a:prstGeom>
+            <a:solidFill>
+              <a:schemeClr val="accent5">
+                <a:lumMod val="20000"/>
+                <a:lumOff val="80000"/>
+              </a:schemeClr>
+            </a:solidFill>
+          </p:spPr>
+          <p:style>
+            <a:lnRef idx="2">
+              <a:schemeClr val="accent1">
+                <a:shade val="50000"/>
+              </a:schemeClr>
+            </a:lnRef>
+            <a:fillRef idx="1">
+              <a:schemeClr val="accent1"/>
+            </a:fillRef>
+            <a:effectRef idx="0">
+              <a:schemeClr val="accent1"/>
+            </a:effectRef>
+            <a:fontRef idx="minor">
+              <a:schemeClr val="lt1"/>
+            </a:fontRef>
+          </p:style>
+          <p:txBody>
+            <a:bodyPr rtlCol="0" anchor="ctr"/>
+            <a:lstStyle/>
+            <a:p>
+              <a:pPr algn="ctr"/>
+              <a:endParaRPr lang="en-US"/>
+            </a:p>
+          </p:txBody>
+        </p:sp>
+        <p:sp>
+          <p:nvSpPr>
+            <p:cNvPr id="65" name="Rounded Rectangle 64"/>
+            <p:cNvSpPr/>
+            <p:nvPr/>
+          </p:nvSpPr>
+          <p:spPr>
+            <a:xfrm>
+              <a:off x="7364910" y="394540"/>
+              <a:ext cx="2621042" cy="518785"/>
+            </a:xfrm>
+            <a:prstGeom prst="roundRect">
+              <a:avLst/>
+            </a:prstGeom>
+            <a:noFill/>
+            <a:ln>
+              <a:noFill/>
+            </a:ln>
+          </p:spPr>
+          <p:style>
+            <a:lnRef idx="2">
+              <a:schemeClr val="accent1">
+                <a:shade val="50000"/>
+              </a:schemeClr>
+            </a:lnRef>
+            <a:fillRef idx="1">
+              <a:schemeClr val="accent1"/>
+            </a:fillRef>
+            <a:effectRef idx="0">
+              <a:schemeClr val="accent1"/>
+            </a:effectRef>
+            <a:fontRef idx="minor">
+              <a:schemeClr val="lt1"/>
+            </a:fontRef>
+          </p:style>
+          <p:txBody>
+            <a:bodyPr rtlCol="0" anchor="ctr"/>
+            <a:lstStyle/>
+            <a:p>
+              <a:r>
+                <a:rPr lang="en-US" sz="1600" u="sng" dirty="0" smtClean="0">
+                  <a:solidFill>
+                    <a:schemeClr val="tx1"/>
+                  </a:solidFill>
+                </a:rPr>
+                <a:t>Standardized Polygon Tables</a:t>
+              </a:r>
+              <a:endParaRPr lang="en-US" sz="1600" dirty="0">
+                <a:solidFill>
+                  <a:schemeClr val="tx1"/>
+                </a:solidFill>
+              </a:endParaRPr>
+            </a:p>
+          </p:txBody>
+        </p:sp>
+        <p:sp>
+          <p:nvSpPr>
+            <p:cNvPr id="66" name="Rounded Rectangle 65"/>
+            <p:cNvSpPr/>
+            <p:nvPr/>
+          </p:nvSpPr>
+          <p:spPr>
+            <a:xfrm>
+              <a:off x="6440669" y="666937"/>
+              <a:ext cx="1927996" cy="518785"/>
+            </a:xfrm>
+            <a:prstGeom prst="roundRect">
+              <a:avLst/>
+            </a:prstGeom>
+            <a:noFill/>
+            <a:ln>
+              <a:noFill/>
+            </a:ln>
+          </p:spPr>
+          <p:style>
+            <a:lnRef idx="2">
+              <a:schemeClr val="accent1">
+                <a:shade val="50000"/>
+              </a:schemeClr>
+            </a:lnRef>
+            <a:fillRef idx="1">
+              <a:schemeClr val="accent1"/>
+            </a:fillRef>
+            <a:effectRef idx="0">
+              <a:schemeClr val="accent1"/>
+            </a:effectRef>
+            <a:fontRef idx="minor">
+              <a:schemeClr val="lt1"/>
+            </a:fontRef>
+          </p:style>
+          <p:txBody>
+            <a:bodyPr rtlCol="0" anchor="ctr"/>
+            <a:lstStyle/>
+            <a:p>
+              <a:r>
+                <a:rPr lang="en-US" sz="1600" dirty="0" smtClean="0">
+                  <a:solidFill>
+                    <a:schemeClr val="tx1"/>
+                  </a:solidFill>
+                </a:rPr>
+                <a:t>1. Default Values</a:t>
+              </a:r>
+              <a:endParaRPr lang="en-US" sz="1600" dirty="0">
+                <a:solidFill>
+                  <a:schemeClr val="tx1"/>
+                </a:solidFill>
+              </a:endParaRPr>
+            </a:p>
+          </p:txBody>
+        </p:sp>
+        <p:sp>
+          <p:nvSpPr>
+            <p:cNvPr id="67" name="Rounded Rectangle 66"/>
+            <p:cNvSpPr/>
+            <p:nvPr/>
+          </p:nvSpPr>
+          <p:spPr>
+            <a:xfrm>
+              <a:off x="8792713" y="654656"/>
+              <a:ext cx="2502585" cy="518785"/>
+            </a:xfrm>
+            <a:prstGeom prst="roundRect">
+              <a:avLst/>
+            </a:prstGeom>
+            <a:noFill/>
+            <a:ln>
+              <a:noFill/>
+            </a:ln>
+          </p:spPr>
+          <p:style>
+            <a:lnRef idx="2">
+              <a:schemeClr val="accent1">
+                <a:shade val="50000"/>
+              </a:schemeClr>
+            </a:lnRef>
+            <a:fillRef idx="1">
+              <a:schemeClr val="accent1"/>
+            </a:fillRef>
+            <a:effectRef idx="0">
+              <a:schemeClr val="accent1"/>
+            </a:effectRef>
+            <a:fontRef idx="minor">
+              <a:schemeClr val="lt1"/>
+            </a:fontRef>
+          </p:style>
+          <p:txBody>
+            <a:bodyPr rtlCol="0" anchor="ctr"/>
+            <a:lstStyle/>
+            <a:p>
+              <a:r>
+                <a:rPr lang="en-US" sz="1600" dirty="0" smtClean="0">
+                  <a:solidFill>
+                    <a:schemeClr val="tx1"/>
+                  </a:solidFill>
+                </a:rPr>
+                <a:t>2. Blank Template for users</a:t>
+              </a:r>
+              <a:endParaRPr lang="en-US" sz="1600" dirty="0">
+                <a:solidFill>
+                  <a:schemeClr val="tx1"/>
+                </a:solidFill>
+              </a:endParaRPr>
+            </a:p>
+          </p:txBody>
+        </p:sp>
+      </p:grpSp>
+      <p:pic>
+        <p:nvPicPr>
+          <p:cNvPr id="68" name="Picture 67"/>
+          <p:cNvPicPr>
+            <a:picLocks noChangeAspect="1"/>
+          </p:cNvPicPr>
+          <p:nvPr/>
+        </p:nvPicPr>
+        <p:blipFill>
+          <a:blip r:embed="rId8"/>
+          <a:stretch>
+            <a:fillRect/>
+          </a:stretch>
+        </p:blipFill>
+        <p:spPr>
+          <a:xfrm>
+            <a:off x="6767231" y="4337288"/>
+            <a:ext cx="2397702" cy="659486"/>
+          </a:xfrm>
+          <a:prstGeom prst="rect">
+            <a:avLst/>
+          </a:prstGeom>
+        </p:spPr>
+      </p:pic>
+      <p:pic>
+        <p:nvPicPr>
+          <p:cNvPr id="69" name="Picture 68"/>
+          <p:cNvPicPr>
+            <a:picLocks noChangeAspect="1"/>
+          </p:cNvPicPr>
+          <p:nvPr/>
+        </p:nvPicPr>
+        <p:blipFill>
+          <a:blip r:embed="rId8"/>
+          <a:stretch>
+            <a:fillRect/>
+          </a:stretch>
+        </p:blipFill>
+        <p:spPr>
+          <a:xfrm>
+            <a:off x="9510047" y="4342439"/>
+            <a:ext cx="2397702" cy="659486"/>
+          </a:xfrm>
+          <a:prstGeom prst="rect">
+            <a:avLst/>
+          </a:prstGeom>
+        </p:spPr>
+      </p:pic>
+      <p:grpSp>
+        <p:nvGrpSpPr>
+          <p:cNvPr id="70" name="Group 69"/>
+          <p:cNvGrpSpPr/>
+          <p:nvPr/>
+        </p:nvGrpSpPr>
+        <p:grpSpPr>
+          <a:xfrm>
+            <a:off x="657785" y="4522740"/>
+            <a:ext cx="3389190" cy="1593669"/>
+            <a:chOff x="37949" y="2526163"/>
+            <a:chExt cx="3389190" cy="1593669"/>
+          </a:xfrm>
+        </p:grpSpPr>
+        <p:sp>
+          <p:nvSpPr>
+            <p:cNvPr id="71" name="Rounded Rectangle 70"/>
+            <p:cNvSpPr/>
+            <p:nvPr/>
+          </p:nvSpPr>
+          <p:spPr>
+            <a:xfrm>
+              <a:off x="37949" y="2526163"/>
+              <a:ext cx="3299611" cy="1593669"/>
+            </a:xfrm>
+            <a:prstGeom prst="roundRect">
+              <a:avLst/>
+            </a:prstGeom>
+            <a:solidFill>
+              <a:schemeClr val="accent6">
+                <a:lumMod val="20000"/>
+                <a:lumOff val="80000"/>
+              </a:schemeClr>
+            </a:solidFill>
+          </p:spPr>
+          <p:style>
+            <a:lnRef idx="2">
+              <a:schemeClr val="accent1">
+                <a:shade val="50000"/>
+              </a:schemeClr>
+            </a:lnRef>
+            <a:fillRef idx="1">
+              <a:schemeClr val="accent1"/>
+            </a:fillRef>
+            <a:effectRef idx="0">
+              <a:schemeClr val="accent1"/>
+            </a:effectRef>
+            <a:fontRef idx="minor">
+              <a:schemeClr val="lt1"/>
+            </a:fontRef>
+          </p:style>
+          <p:txBody>
+            <a:bodyPr rtlCol="0" anchor="ctr"/>
+            <a:lstStyle/>
+            <a:p>
+              <a:pPr algn="ctr"/>
+              <a:endParaRPr lang="en-US"/>
+            </a:p>
+          </p:txBody>
+        </p:sp>
+        <p:pic>
+          <p:nvPicPr>
+            <p:cNvPr id="72" name="Picture 71"/>
+            <p:cNvPicPr>
+              <a:picLocks noChangeAspect="1"/>
+            </p:cNvPicPr>
+            <p:nvPr/>
+          </p:nvPicPr>
+          <p:blipFill rotWithShape="1">
+            <a:blip r:embed="rId6" cstate="print">
+              <a:extLst>
+                <a:ext uri="{28A0092B-C50C-407E-A947-70E740481C1C}">
+                  <a14:useLocalDpi xmlns:a14="http://schemas.microsoft.com/office/drawing/2010/main" val="0"/>
+                </a:ext>
+              </a:extLst>
+            </a:blip>
+            <a:srcRect l="4143" t="20175" r="33076" b="20825"/>
+            <a:stretch/>
+          </p:blipFill>
+          <p:spPr>
+            <a:xfrm>
+              <a:off x="2262760" y="3157338"/>
+              <a:ext cx="893902" cy="872374"/>
+            </a:xfrm>
+            <a:prstGeom prst="rect">
+              <a:avLst/>
+            </a:prstGeom>
+          </p:spPr>
+        </p:pic>
+        <p:pic>
+          <p:nvPicPr>
+            <p:cNvPr id="73" name="Picture 72"/>
+            <p:cNvPicPr>
+              <a:picLocks noChangeAspect="1"/>
+            </p:cNvPicPr>
+            <p:nvPr/>
+          </p:nvPicPr>
+          <p:blipFill>
+            <a:blip r:embed="rId7"/>
+            <a:stretch>
+              <a:fillRect/>
+            </a:stretch>
+          </p:blipFill>
+          <p:spPr>
+            <a:xfrm>
+              <a:off x="122048" y="3208549"/>
+              <a:ext cx="1999767" cy="546105"/>
+            </a:xfrm>
+            <a:prstGeom prst="rect">
+              <a:avLst/>
+            </a:prstGeom>
+          </p:spPr>
+        </p:pic>
+        <p:sp>
+          <p:nvSpPr>
+            <p:cNvPr id="74" name="Rounded Rectangle 73"/>
+            <p:cNvSpPr/>
+            <p:nvPr/>
+          </p:nvSpPr>
+          <p:spPr>
+            <a:xfrm>
+              <a:off x="165603" y="2650348"/>
+              <a:ext cx="1702982" cy="518785"/>
+            </a:xfrm>
+            <a:prstGeom prst="roundRect">
+              <a:avLst/>
+            </a:prstGeom>
+            <a:noFill/>
+            <a:ln>
+              <a:noFill/>
+            </a:ln>
+          </p:spPr>
+          <p:style>
+            <a:lnRef idx="2">
+              <a:schemeClr val="accent1">
+                <a:shade val="50000"/>
+              </a:schemeClr>
+            </a:lnRef>
+            <a:fillRef idx="1">
+              <a:schemeClr val="accent1"/>
+            </a:fillRef>
+            <a:effectRef idx="0">
+              <a:schemeClr val="accent1"/>
+            </a:effectRef>
+            <a:fontRef idx="minor">
+              <a:schemeClr val="lt1"/>
+            </a:fontRef>
+          </p:style>
+          <p:txBody>
+            <a:bodyPr rtlCol="0" anchor="ctr"/>
+            <a:lstStyle/>
+            <a:p>
+              <a:pPr algn="ctr"/>
+              <a:r>
+                <a:rPr lang="en-US" sz="1600" u="sng" dirty="0" smtClean="0">
+                  <a:solidFill>
+                    <a:schemeClr val="tx1"/>
+                  </a:solidFill>
+                </a:rPr>
+                <a:t>Any Standardized Polygon Table</a:t>
+              </a:r>
+              <a:endParaRPr lang="en-US" sz="1600" u="sng" dirty="0">
+                <a:solidFill>
+                  <a:schemeClr val="tx1"/>
+                </a:solidFill>
+              </a:endParaRPr>
+            </a:p>
+          </p:txBody>
+        </p:sp>
+        <p:sp>
+          <p:nvSpPr>
+            <p:cNvPr id="75" name="Rounded Rectangle 74"/>
+            <p:cNvSpPr/>
+            <p:nvPr/>
+          </p:nvSpPr>
+          <p:spPr>
+            <a:xfrm>
+              <a:off x="2019118" y="2610405"/>
+              <a:ext cx="1408021" cy="518785"/>
+            </a:xfrm>
+            <a:prstGeom prst="roundRect">
+              <a:avLst/>
+            </a:prstGeom>
+            <a:noFill/>
+            <a:ln>
+              <a:noFill/>
+            </a:ln>
+          </p:spPr>
+          <p:style>
+            <a:lnRef idx="2">
+              <a:schemeClr val="accent1">
+                <a:shade val="50000"/>
+              </a:schemeClr>
+            </a:lnRef>
+            <a:fillRef idx="1">
+              <a:schemeClr val="accent1"/>
+            </a:fillRef>
+            <a:effectRef idx="0">
+              <a:schemeClr val="accent1"/>
+            </a:effectRef>
+            <a:fontRef idx="minor">
+              <a:schemeClr val="lt1"/>
+            </a:fontRef>
+          </p:style>
+          <p:txBody>
+            <a:bodyPr rtlCol="0" anchor="ctr"/>
+            <a:lstStyle/>
+            <a:p>
+              <a:pPr algn="ctr"/>
+              <a:r>
+                <a:rPr lang="en-US" sz="1600" u="sng" dirty="0" smtClean="0">
+                  <a:solidFill>
+                    <a:schemeClr val="tx1"/>
+                  </a:solidFill>
+                </a:rPr>
+                <a:t>Polygon Shapefile</a:t>
+              </a:r>
+              <a:endParaRPr lang="en-US" sz="1600" u="sng" dirty="0">
+                <a:solidFill>
+                  <a:schemeClr val="tx1"/>
+                </a:solidFill>
+              </a:endParaRPr>
+            </a:p>
+          </p:txBody>
+        </p:sp>
+      </p:grpSp>
+      <p:grpSp>
+        <p:nvGrpSpPr>
+          <p:cNvPr id="80" name="Group 79"/>
+          <p:cNvGrpSpPr/>
+          <p:nvPr/>
+        </p:nvGrpSpPr>
+        <p:grpSpPr>
+          <a:xfrm>
+            <a:off x="8268636" y="5338856"/>
+            <a:ext cx="2309129" cy="1324925"/>
+            <a:chOff x="6454560" y="5148751"/>
+            <a:chExt cx="2309129" cy="1324925"/>
+          </a:xfrm>
+        </p:grpSpPr>
+        <p:grpSp>
+          <p:nvGrpSpPr>
+            <p:cNvPr id="54" name="Group 53"/>
+            <p:cNvGrpSpPr>
+              <a:grpSpLocks noChangeAspect="1"/>
+            </p:cNvGrpSpPr>
+            <p:nvPr/>
+          </p:nvGrpSpPr>
+          <p:grpSpPr>
+            <a:xfrm>
+              <a:off x="6468393" y="5148751"/>
+              <a:ext cx="2200120" cy="1324925"/>
+              <a:chOff x="6220835" y="464686"/>
+              <a:chExt cx="2200120" cy="1324925"/>
+            </a:xfrm>
+          </p:grpSpPr>
+          <p:sp>
+            <p:nvSpPr>
+              <p:cNvPr id="58" name="Rounded Rectangle 57"/>
+              <p:cNvSpPr/>
+              <p:nvPr/>
+            </p:nvSpPr>
+            <p:spPr>
+              <a:xfrm>
+                <a:off x="6220835" y="512763"/>
+                <a:ext cx="2200120" cy="1276848"/>
+              </a:xfrm>
+              <a:prstGeom prst="roundRect">
+                <a:avLst/>
+              </a:prstGeom>
+              <a:solidFill>
+                <a:schemeClr val="accent5">
+                  <a:lumMod val="20000"/>
+                  <a:lumOff val="80000"/>
+                </a:schemeClr>
+              </a:solidFill>
+            </p:spPr>
+            <p:style>
+              <a:lnRef idx="2">
+                <a:schemeClr val="accent1">
+                  <a:shade val="50000"/>
+                </a:schemeClr>
+              </a:lnRef>
+              <a:fillRef idx="1">
+                <a:schemeClr val="accent1"/>
+              </a:fillRef>
+              <a:effectRef idx="0">
+                <a:schemeClr val="accent1"/>
+              </a:effectRef>
+              <a:fontRef idx="minor">
+                <a:schemeClr val="lt1"/>
+              </a:fontRef>
+            </p:style>
+            <p:txBody>
+              <a:bodyPr rtlCol="0" anchor="ctr"/>
+              <a:lstStyle/>
+              <a:p>
+                <a:pPr algn="ctr"/>
+                <a:endParaRPr lang="en-US"/>
+              </a:p>
+            </p:txBody>
+          </p:sp>
+          <p:sp>
+            <p:nvSpPr>
+              <p:cNvPr id="59" name="Rounded Rectangle 58"/>
+              <p:cNvSpPr/>
+              <p:nvPr/>
+            </p:nvSpPr>
+            <p:spPr>
+              <a:xfrm>
+                <a:off x="7011475" y="464686"/>
+                <a:ext cx="802286" cy="344396"/>
+              </a:xfrm>
+              <a:prstGeom prst="roundRect">
+                <a:avLst/>
+              </a:prstGeom>
+              <a:noFill/>
+              <a:ln>
+                <a:noFill/>
+              </a:ln>
+            </p:spPr>
+            <p:style>
+              <a:lnRef idx="2">
+                <a:schemeClr val="accent1">
+                  <a:shade val="50000"/>
+                </a:schemeClr>
+              </a:lnRef>
+              <a:fillRef idx="1">
+                <a:schemeClr val="accent1"/>
+              </a:fillRef>
+              <a:effectRef idx="0">
+                <a:schemeClr val="accent1"/>
+              </a:effectRef>
+              <a:fontRef idx="minor">
+                <a:schemeClr val="lt1"/>
+              </a:fontRef>
+            </p:style>
+            <p:txBody>
+              <a:bodyPr rtlCol="0" anchor="ctr"/>
+              <a:lstStyle/>
+              <a:p>
+                <a:r>
+                  <a:rPr lang="en-US" sz="1600" u="sng" dirty="0" smtClean="0">
+                    <a:solidFill>
+                      <a:schemeClr val="tx1"/>
+                    </a:solidFill>
+                  </a:rPr>
+                  <a:t>Maps</a:t>
+                </a:r>
+                <a:endParaRPr lang="en-US" sz="1600" dirty="0">
+                  <a:solidFill>
+                    <a:schemeClr val="tx1"/>
+                  </a:solidFill>
+                </a:endParaRPr>
+              </a:p>
+            </p:txBody>
+          </p:sp>
+        </p:grpSp>
+        <p:pic>
+          <p:nvPicPr>
+            <p:cNvPr id="76" name="Picture 75"/>
+            <p:cNvPicPr>
+              <a:picLocks noChangeAspect="1"/>
+            </p:cNvPicPr>
+            <p:nvPr/>
+          </p:nvPicPr>
+          <p:blipFill>
+            <a:blip r:embed="rId9"/>
+            <a:stretch>
+              <a:fillRect/>
+            </a:stretch>
+          </p:blipFill>
+          <p:spPr>
+            <a:xfrm>
+              <a:off x="6672142" y="5716618"/>
+              <a:ext cx="720492" cy="695956"/>
+            </a:xfrm>
+            <a:prstGeom prst="rect">
+              <a:avLst/>
+            </a:prstGeom>
+          </p:spPr>
+        </p:pic>
+        <p:pic>
+          <p:nvPicPr>
+            <p:cNvPr id="77" name="Picture 76"/>
+            <p:cNvPicPr>
+              <a:picLocks noChangeAspect="1"/>
+            </p:cNvPicPr>
+            <p:nvPr/>
+          </p:nvPicPr>
+          <p:blipFill>
+            <a:blip r:embed="rId10"/>
+            <a:stretch>
+              <a:fillRect/>
+            </a:stretch>
+          </p:blipFill>
+          <p:spPr>
+            <a:xfrm>
+              <a:off x="7741467" y="5716618"/>
+              <a:ext cx="720028" cy="688428"/>
+            </a:xfrm>
+            <a:prstGeom prst="rect">
+              <a:avLst/>
+            </a:prstGeom>
+          </p:spPr>
+        </p:pic>
+        <p:sp>
+          <p:nvSpPr>
+            <p:cNvPr id="78" name="Rounded Rectangle 77"/>
+            <p:cNvSpPr/>
+            <p:nvPr/>
+          </p:nvSpPr>
+          <p:spPr>
+            <a:xfrm>
+              <a:off x="6454560" y="5442044"/>
+              <a:ext cx="1125701" cy="321534"/>
+            </a:xfrm>
+            <a:prstGeom prst="roundRect">
+              <a:avLst/>
+            </a:prstGeom>
+            <a:noFill/>
+            <a:ln>
+              <a:noFill/>
+            </a:ln>
+          </p:spPr>
+          <p:style>
+            <a:lnRef idx="2">
+              <a:schemeClr val="accent1">
+                <a:shade val="50000"/>
+              </a:schemeClr>
+            </a:lnRef>
+            <a:fillRef idx="1">
+              <a:schemeClr val="accent1"/>
+            </a:fillRef>
+            <a:effectRef idx="0">
+              <a:schemeClr val="accent1"/>
+            </a:effectRef>
+            <a:fontRef idx="minor">
+              <a:schemeClr val="lt1"/>
+            </a:fontRef>
+          </p:style>
+          <p:txBody>
+            <a:bodyPr rtlCol="0" anchor="ctr"/>
+            <a:lstStyle/>
+            <a:p>
+              <a:r>
+                <a:rPr lang="en-US" sz="1600" dirty="0" smtClean="0">
+                  <a:solidFill>
+                    <a:schemeClr val="tx1"/>
+                  </a:solidFill>
+                </a:rPr>
+                <a:t>1. Gridded</a:t>
+              </a:r>
+              <a:endParaRPr lang="en-US" sz="1600" dirty="0">
+                <a:solidFill>
+                  <a:schemeClr val="tx1"/>
+                </a:solidFill>
+              </a:endParaRPr>
+            </a:p>
+          </p:txBody>
+        </p:sp>
+        <p:sp>
+          <p:nvSpPr>
+            <p:cNvPr id="79" name="Rounded Rectangle 78"/>
+            <p:cNvSpPr/>
+            <p:nvPr/>
+          </p:nvSpPr>
+          <p:spPr>
+            <a:xfrm>
+              <a:off x="7566119" y="5404542"/>
+              <a:ext cx="1197570" cy="328485"/>
+            </a:xfrm>
+            <a:prstGeom prst="roundRect">
+              <a:avLst/>
+            </a:prstGeom>
+            <a:noFill/>
+            <a:ln>
+              <a:noFill/>
+            </a:ln>
+          </p:spPr>
+          <p:style>
+            <a:lnRef idx="2">
+              <a:schemeClr val="accent1">
+                <a:shade val="50000"/>
+              </a:schemeClr>
+            </a:lnRef>
+            <a:fillRef idx="1">
+              <a:schemeClr val="accent1"/>
+            </a:fillRef>
+            <a:effectRef idx="0">
+              <a:schemeClr val="accent1"/>
+            </a:effectRef>
+            <a:fontRef idx="minor">
+              <a:schemeClr val="lt1"/>
+            </a:fontRef>
+          </p:style>
+          <p:txBody>
+            <a:bodyPr rtlCol="0" anchor="ctr"/>
+            <a:lstStyle/>
+            <a:p>
+              <a:r>
+                <a:rPr lang="en-US" sz="1600" dirty="0" smtClean="0">
+                  <a:solidFill>
+                    <a:schemeClr val="tx1"/>
+                  </a:solidFill>
+                </a:rPr>
+                <a:t>2. Polygons</a:t>
+              </a:r>
+              <a:endParaRPr lang="en-US" sz="1600" dirty="0">
+                <a:solidFill>
+                  <a:schemeClr val="tx1"/>
+                </a:solidFill>
+              </a:endParaRPr>
+            </a:p>
+          </p:txBody>
+        </p:sp>
+      </p:grpSp>
+      <p:cxnSp>
+        <p:nvCxnSpPr>
+          <p:cNvPr id="82" name="Straight Connector 81"/>
+          <p:cNvCxnSpPr>
+            <a:stCxn id="10" idx="2"/>
+            <a:endCxn id="4" idx="0"/>
+          </p:cNvCxnSpPr>
+          <p:nvPr/>
+        </p:nvCxnSpPr>
+        <p:spPr>
+          <a:xfrm flipH="1">
+            <a:off x="5237562" y="850336"/>
+            <a:ext cx="1951" cy="454893"/>
+          </a:xfrm>
+          <a:prstGeom prst="line">
+            <a:avLst/>
+          </a:prstGeom>
+        </p:spPr>
+        <p:style>
+          <a:lnRef idx="1">
+            <a:schemeClr val="dk1"/>
+          </a:lnRef>
+          <a:fillRef idx="0">
+            <a:schemeClr val="dk1"/>
+          </a:fillRef>
+          <a:effectRef idx="0">
+            <a:schemeClr val="dk1"/>
+          </a:effectRef>
+          <a:fontRef idx="minor">
+            <a:schemeClr val="tx1"/>
+          </a:fontRef>
+        </p:style>
+      </p:cxnSp>
+      <p:cxnSp>
+        <p:nvCxnSpPr>
+          <p:cNvPr id="84" name="Straight Connector 83"/>
+          <p:cNvCxnSpPr>
+            <a:stCxn id="20" idx="1"/>
+            <a:endCxn id="4" idx="3"/>
+          </p:cNvCxnSpPr>
+          <p:nvPr/>
+        </p:nvCxnSpPr>
+        <p:spPr>
+          <a:xfrm flipH="1">
+            <a:off x="6083110" y="1456775"/>
+            <a:ext cx="609850" cy="718"/>
+          </a:xfrm>
+          <a:prstGeom prst="line">
+            <a:avLst/>
+          </a:prstGeom>
+        </p:spPr>
+        <p:style>
+          <a:lnRef idx="1">
+            <a:schemeClr val="dk1"/>
+          </a:lnRef>
+          <a:fillRef idx="0">
+            <a:schemeClr val="dk1"/>
+          </a:fillRef>
+          <a:effectRef idx="0">
+            <a:schemeClr val="dk1"/>
+          </a:effectRef>
+          <a:fontRef idx="minor">
+            <a:schemeClr val="tx1"/>
+          </a:fontRef>
+        </p:style>
+      </p:cxnSp>
+      <p:cxnSp>
+        <p:nvCxnSpPr>
+          <p:cNvPr id="88" name="Straight Connector 87"/>
+          <p:cNvCxnSpPr>
+            <a:stCxn id="4" idx="2"/>
+            <a:endCxn id="5" idx="0"/>
+          </p:cNvCxnSpPr>
+          <p:nvPr/>
+        </p:nvCxnSpPr>
+        <p:spPr>
+          <a:xfrm>
+            <a:off x="5237562" y="1609756"/>
+            <a:ext cx="0" cy="835074"/>
+          </a:xfrm>
+          <a:prstGeom prst="line">
+            <a:avLst/>
+          </a:prstGeom>
+        </p:spPr>
+        <p:style>
+          <a:lnRef idx="1">
+            <a:schemeClr val="dk1"/>
+          </a:lnRef>
+          <a:fillRef idx="0">
+            <a:schemeClr val="dk1"/>
+          </a:fillRef>
+          <a:effectRef idx="0">
+            <a:schemeClr val="dk1"/>
+          </a:effectRef>
+          <a:fontRef idx="minor">
+            <a:schemeClr val="tx1"/>
+          </a:fontRef>
+        </p:style>
+      </p:cxnSp>
+      <p:cxnSp>
+        <p:nvCxnSpPr>
+          <p:cNvPr id="91" name="Straight Connector 90"/>
+          <p:cNvCxnSpPr>
+            <a:stCxn id="5" idx="2"/>
+            <a:endCxn id="6" idx="0"/>
+          </p:cNvCxnSpPr>
+          <p:nvPr/>
+        </p:nvCxnSpPr>
+        <p:spPr>
+          <a:xfrm>
+            <a:off x="5237562" y="2749357"/>
+            <a:ext cx="0" cy="1204386"/>
+          </a:xfrm>
+          <a:prstGeom prst="line">
+            <a:avLst/>
+          </a:prstGeom>
+        </p:spPr>
+        <p:style>
+          <a:lnRef idx="1">
+            <a:schemeClr val="dk1"/>
+          </a:lnRef>
+          <a:fillRef idx="0">
+            <a:schemeClr val="dk1"/>
+          </a:fillRef>
+          <a:effectRef idx="0">
+            <a:schemeClr val="dk1"/>
+          </a:effectRef>
+          <a:fontRef idx="minor">
+            <a:schemeClr val="tx1"/>
+          </a:fontRef>
+        </p:style>
+      </p:cxnSp>
+      <p:cxnSp>
+        <p:nvCxnSpPr>
+          <p:cNvPr id="94" name="Straight Connector 93"/>
+          <p:cNvCxnSpPr>
+            <a:stCxn id="6" idx="2"/>
+            <a:endCxn id="7" idx="0"/>
+          </p:cNvCxnSpPr>
+          <p:nvPr/>
+        </p:nvCxnSpPr>
+        <p:spPr>
+          <a:xfrm>
+            <a:off x="5237562" y="4258270"/>
+            <a:ext cx="1411" cy="1615755"/>
+          </a:xfrm>
+          <a:prstGeom prst="line">
+            <a:avLst/>
+          </a:prstGeom>
+        </p:spPr>
+        <p:style>
+          <a:lnRef idx="1">
+            <a:schemeClr val="dk1"/>
+          </a:lnRef>
+          <a:fillRef idx="0">
+            <a:schemeClr val="dk1"/>
+          </a:fillRef>
+          <a:effectRef idx="0">
+            <a:schemeClr val="dk1"/>
+          </a:effectRef>
+          <a:fontRef idx="minor">
+            <a:schemeClr val="tx1"/>
+          </a:fontRef>
+        </p:style>
+      </p:cxnSp>
+      <p:cxnSp>
+        <p:nvCxnSpPr>
+          <p:cNvPr id="102" name="Straight Connector 101"/>
+          <p:cNvCxnSpPr/>
+          <p:nvPr/>
+        </p:nvCxnSpPr>
+        <p:spPr>
+          <a:xfrm flipH="1">
+            <a:off x="5238972" y="1940579"/>
+            <a:ext cx="1441671" cy="0"/>
+          </a:xfrm>
+          <a:prstGeom prst="line">
+            <a:avLst/>
+          </a:prstGeom>
+        </p:spPr>
+        <p:style>
+          <a:lnRef idx="1">
+            <a:schemeClr val="dk1"/>
+          </a:lnRef>
+          <a:fillRef idx="0">
+            <a:schemeClr val="dk1"/>
+          </a:fillRef>
+          <a:effectRef idx="0">
+            <a:schemeClr val="dk1"/>
+          </a:effectRef>
+          <a:fontRef idx="minor">
+            <a:schemeClr val="tx1"/>
+          </a:fontRef>
+        </p:style>
+      </p:cxnSp>
+      <p:cxnSp>
+        <p:nvCxnSpPr>
+          <p:cNvPr id="104" name="Straight Connector 103"/>
+          <p:cNvCxnSpPr/>
+          <p:nvPr/>
+        </p:nvCxnSpPr>
+        <p:spPr>
+          <a:xfrm flipH="1">
+            <a:off x="3505410" y="2211158"/>
+            <a:ext cx="1733562" cy="0"/>
+          </a:xfrm>
+          <a:prstGeom prst="line">
+            <a:avLst/>
+          </a:prstGeom>
+        </p:spPr>
+        <p:style>
+          <a:lnRef idx="1">
+            <a:schemeClr val="dk1"/>
+          </a:lnRef>
+          <a:fillRef idx="0">
+            <a:schemeClr val="dk1"/>
+          </a:fillRef>
+          <a:effectRef idx="0">
+            <a:schemeClr val="dk1"/>
+          </a:effectRef>
+          <a:fontRef idx="minor">
+            <a:schemeClr val="tx1"/>
+          </a:fontRef>
+        </p:style>
+      </p:cxnSp>
+      <p:cxnSp>
+        <p:nvCxnSpPr>
+          <p:cNvPr id="106" name="Straight Connector 105"/>
+          <p:cNvCxnSpPr>
+            <a:endCxn id="11" idx="3"/>
+          </p:cNvCxnSpPr>
+          <p:nvPr/>
+        </p:nvCxnSpPr>
+        <p:spPr>
+          <a:xfrm flipH="1">
+            <a:off x="3136099" y="1093151"/>
+            <a:ext cx="2102873" cy="0"/>
+          </a:xfrm>
+          <a:prstGeom prst="line">
+            <a:avLst/>
+          </a:prstGeom>
+        </p:spPr>
+        <p:style>
+          <a:lnRef idx="1">
+            <a:schemeClr val="dk1"/>
+          </a:lnRef>
+          <a:fillRef idx="0">
+            <a:schemeClr val="dk1"/>
+          </a:fillRef>
+          <a:effectRef idx="0">
+            <a:schemeClr val="dk1"/>
+          </a:effectRef>
+          <a:fontRef idx="minor">
+            <a:schemeClr val="tx1"/>
+          </a:fontRef>
+        </p:style>
+      </p:cxnSp>
+      <p:cxnSp>
+        <p:nvCxnSpPr>
+          <p:cNvPr id="109" name="Straight Connector 108"/>
+          <p:cNvCxnSpPr>
+            <a:endCxn id="5" idx="3"/>
+          </p:cNvCxnSpPr>
+          <p:nvPr/>
+        </p:nvCxnSpPr>
+        <p:spPr>
+          <a:xfrm flipH="1">
+            <a:off x="6083110" y="2596323"/>
+            <a:ext cx="713900" cy="771"/>
+          </a:xfrm>
+          <a:prstGeom prst="line">
+            <a:avLst/>
+          </a:prstGeom>
+        </p:spPr>
+        <p:style>
+          <a:lnRef idx="1">
+            <a:schemeClr val="dk1"/>
+          </a:lnRef>
+          <a:fillRef idx="0">
+            <a:schemeClr val="dk1"/>
+          </a:fillRef>
+          <a:effectRef idx="0">
+            <a:schemeClr val="dk1"/>
+          </a:effectRef>
+          <a:fontRef idx="minor">
+            <a:schemeClr val="tx1"/>
+          </a:fontRef>
+        </p:style>
+      </p:cxnSp>
+      <p:cxnSp>
+        <p:nvCxnSpPr>
+          <p:cNvPr id="112" name="Straight Connector 111"/>
+          <p:cNvCxnSpPr/>
+          <p:nvPr/>
+        </p:nvCxnSpPr>
+        <p:spPr>
+          <a:xfrm flipH="1" flipV="1">
+            <a:off x="5238972" y="3044490"/>
+            <a:ext cx="1560541" cy="376"/>
+          </a:xfrm>
+          <a:prstGeom prst="line">
+            <a:avLst/>
+          </a:prstGeom>
+        </p:spPr>
+        <p:style>
+          <a:lnRef idx="1">
+            <a:schemeClr val="dk1"/>
+          </a:lnRef>
+          <a:fillRef idx="0">
+            <a:schemeClr val="dk1"/>
+          </a:fillRef>
+          <a:effectRef idx="0">
+            <a:schemeClr val="dk1"/>
+          </a:effectRef>
+          <a:fontRef idx="minor">
+            <a:schemeClr val="tx1"/>
+          </a:fontRef>
+        </p:style>
+      </p:cxnSp>
+      <p:cxnSp>
+        <p:nvCxnSpPr>
+          <p:cNvPr id="114" name="Straight Connector 113"/>
+          <p:cNvCxnSpPr>
+            <a:endCxn id="49" idx="3"/>
+          </p:cNvCxnSpPr>
+          <p:nvPr/>
+        </p:nvCxnSpPr>
+        <p:spPr>
+          <a:xfrm flipH="1">
+            <a:off x="3931478" y="3543950"/>
+            <a:ext cx="1307494" cy="0"/>
+          </a:xfrm>
+          <a:prstGeom prst="line">
+            <a:avLst/>
+          </a:prstGeom>
+        </p:spPr>
+        <p:style>
+          <a:lnRef idx="1">
+            <a:schemeClr val="dk1"/>
+          </a:lnRef>
+          <a:fillRef idx="0">
+            <a:schemeClr val="dk1"/>
+          </a:fillRef>
+          <a:effectRef idx="0">
+            <a:schemeClr val="dk1"/>
+          </a:effectRef>
+          <a:fontRef idx="minor">
+            <a:schemeClr val="tx1"/>
+          </a:fontRef>
+        </p:style>
+      </p:cxnSp>
+      <p:cxnSp>
+        <p:nvCxnSpPr>
+          <p:cNvPr id="120" name="Straight Connector 119"/>
+          <p:cNvCxnSpPr>
+            <a:endCxn id="6" idx="3"/>
+          </p:cNvCxnSpPr>
+          <p:nvPr/>
+        </p:nvCxnSpPr>
+        <p:spPr>
+          <a:xfrm flipH="1">
+            <a:off x="6083110" y="4106006"/>
+            <a:ext cx="597533" cy="1"/>
+          </a:xfrm>
+          <a:prstGeom prst="line">
+            <a:avLst/>
+          </a:prstGeom>
+        </p:spPr>
+        <p:style>
+          <a:lnRef idx="1">
+            <a:schemeClr val="dk1"/>
+          </a:lnRef>
+          <a:fillRef idx="0">
+            <a:schemeClr val="dk1"/>
+          </a:fillRef>
+          <a:effectRef idx="0">
+            <a:schemeClr val="dk1"/>
+          </a:effectRef>
+          <a:fontRef idx="minor">
+            <a:schemeClr val="tx1"/>
+          </a:fontRef>
+        </p:style>
+      </p:cxnSp>
+      <p:cxnSp>
+        <p:nvCxnSpPr>
+          <p:cNvPr id="123" name="Straight Connector 122"/>
+          <p:cNvCxnSpPr/>
+          <p:nvPr/>
+        </p:nvCxnSpPr>
+        <p:spPr>
+          <a:xfrm flipH="1" flipV="1">
+            <a:off x="5234545" y="4645610"/>
+            <a:ext cx="1443338" cy="5088"/>
+          </a:xfrm>
+          <a:prstGeom prst="line">
+            <a:avLst/>
+          </a:prstGeom>
+        </p:spPr>
+        <p:style>
+          <a:lnRef idx="1">
+            <a:schemeClr val="dk1"/>
+          </a:lnRef>
+          <a:fillRef idx="0">
+            <a:schemeClr val="dk1"/>
+          </a:fillRef>
+          <a:effectRef idx="0">
+            <a:schemeClr val="dk1"/>
+          </a:effectRef>
+          <a:fontRef idx="minor">
+            <a:schemeClr val="tx1"/>
+          </a:fontRef>
+        </p:style>
+      </p:cxnSp>
+      <p:cxnSp>
+        <p:nvCxnSpPr>
+          <p:cNvPr id="125" name="Straight Connector 124"/>
+          <p:cNvCxnSpPr>
+            <a:endCxn id="71" idx="3"/>
+          </p:cNvCxnSpPr>
+          <p:nvPr/>
+        </p:nvCxnSpPr>
+        <p:spPr>
+          <a:xfrm flipH="1">
+            <a:off x="3957396" y="5319574"/>
+            <a:ext cx="1281576" cy="1"/>
+          </a:xfrm>
+          <a:prstGeom prst="line">
+            <a:avLst/>
+          </a:prstGeom>
+        </p:spPr>
+        <p:style>
+          <a:lnRef idx="1">
+            <a:schemeClr val="dk1"/>
+          </a:lnRef>
+          <a:fillRef idx="0">
+            <a:schemeClr val="dk1"/>
+          </a:fillRef>
+          <a:effectRef idx="0">
+            <a:schemeClr val="dk1"/>
+          </a:effectRef>
+          <a:fontRef idx="minor">
+            <a:schemeClr val="tx1"/>
+          </a:fontRef>
+        </p:style>
+      </p:cxnSp>
+      <p:cxnSp>
+        <p:nvCxnSpPr>
+          <p:cNvPr id="128" name="Straight Connector 127"/>
+          <p:cNvCxnSpPr>
+            <a:stCxn id="58" idx="1"/>
+            <a:endCxn id="7" idx="3"/>
+          </p:cNvCxnSpPr>
+          <p:nvPr/>
+        </p:nvCxnSpPr>
+        <p:spPr>
+          <a:xfrm flipH="1">
+            <a:off x="6084521" y="6025357"/>
+            <a:ext cx="2197948" cy="932"/>
+          </a:xfrm>
+          <a:prstGeom prst="line">
+            <a:avLst/>
+          </a:prstGeom>
+        </p:spPr>
+        <p:style>
+          <a:lnRef idx="1">
+            <a:schemeClr val="dk1"/>
+          </a:lnRef>
+          <a:fillRef idx="0">
+            <a:schemeClr val="dk1"/>
+          </a:fillRef>
+          <a:effectRef idx="0">
+            <a:schemeClr val="dk1"/>
+          </a:effectRef>
+          <a:fontRef idx="minor">
+            <a:schemeClr val="tx1"/>
+          </a:fontRef>
+        </p:style>
+      </p:cxnSp>
+    </p:spTree>
+    <p:extLst>
+      <p:ext uri="{BB962C8B-B14F-4D97-AF65-F5344CB8AC3E}">
+        <p14:creationId xmlns:p14="http://schemas.microsoft.com/office/powerpoint/2010/main" val="3400702790"/>
+      </p:ext>
+    </p:extLst>
+  </p:cSld>
+  <p:clrMapOvr>
+    <a:masterClrMapping/>
+  </p:clrMapOvr>
+  <p:timing>
+    <p:tnLst>
+      <p:par>
+        <p:cTn id="1" dur="indefinite" restart="never" nodeType="tmRoot"/>
+      </p:par>
+    </p:tnLst>
+  </p:timing>
+</p:sld>
+</file>
+
 <file path=ppt/theme/theme1.xml><?xml version="1.0" encoding="utf-8"?>
 <a:theme xmlns:a="http://schemas.openxmlformats.org/drawingml/2006/main" name="Office Theme">
   <a:themeElements>

</xml_diff>

<commit_message>
Changed all names from SRN to metis.
</commit_message>
<xml_diff>
--- a/READMEfigs/READMEfigs.pptx
+++ b/READMEfigs/READMEfigs.pptx
@@ -202,7 +202,7 @@
           <a:p>
             <a:fld id="{921607FB-4AF3-41D9-93C1-AF2B65302971}" type="datetimeFigureOut">
               <a:rPr lang="en-US" smtClean="0"/>
-              <a:t>11/16/2018</a:t>
+              <a:t>12/12/2018</a:t>
             </a:fld>
             <a:endParaRPr lang="en-US"/>
           </a:p>
@@ -865,7 +865,7 @@
           <a:p>
             <a:fld id="{11D67388-0790-496E-9A12-37055489AF4F}" type="datetimeFigureOut">
               <a:rPr lang="en-US" smtClean="0"/>
-              <a:t>11/16/2018</a:t>
+              <a:t>12/12/2018</a:t>
             </a:fld>
             <a:endParaRPr lang="en-US"/>
           </a:p>
@@ -1035,7 +1035,7 @@
           <a:p>
             <a:fld id="{11D67388-0790-496E-9A12-37055489AF4F}" type="datetimeFigureOut">
               <a:rPr lang="en-US" smtClean="0"/>
-              <a:t>11/16/2018</a:t>
+              <a:t>12/12/2018</a:t>
             </a:fld>
             <a:endParaRPr lang="en-US"/>
           </a:p>
@@ -1215,7 +1215,7 @@
           <a:p>
             <a:fld id="{11D67388-0790-496E-9A12-37055489AF4F}" type="datetimeFigureOut">
               <a:rPr lang="en-US" smtClean="0"/>
-              <a:t>11/16/2018</a:t>
+              <a:t>12/12/2018</a:t>
             </a:fld>
             <a:endParaRPr lang="en-US"/>
           </a:p>
@@ -1385,7 +1385,7 @@
           <a:p>
             <a:fld id="{11D67388-0790-496E-9A12-37055489AF4F}" type="datetimeFigureOut">
               <a:rPr lang="en-US" smtClean="0"/>
-              <a:t>11/16/2018</a:t>
+              <a:t>12/12/2018</a:t>
             </a:fld>
             <a:endParaRPr lang="en-US"/>
           </a:p>
@@ -1631,7 +1631,7 @@
           <a:p>
             <a:fld id="{11D67388-0790-496E-9A12-37055489AF4F}" type="datetimeFigureOut">
               <a:rPr lang="en-US" smtClean="0"/>
-              <a:t>11/16/2018</a:t>
+              <a:t>12/12/2018</a:t>
             </a:fld>
             <a:endParaRPr lang="en-US"/>
           </a:p>
@@ -1863,7 +1863,7 @@
           <a:p>
             <a:fld id="{11D67388-0790-496E-9A12-37055489AF4F}" type="datetimeFigureOut">
               <a:rPr lang="en-US" smtClean="0"/>
-              <a:t>11/16/2018</a:t>
+              <a:t>12/12/2018</a:t>
             </a:fld>
             <a:endParaRPr lang="en-US"/>
           </a:p>
@@ -2230,7 +2230,7 @@
           <a:p>
             <a:fld id="{11D67388-0790-496E-9A12-37055489AF4F}" type="datetimeFigureOut">
               <a:rPr lang="en-US" smtClean="0"/>
-              <a:t>11/16/2018</a:t>
+              <a:t>12/12/2018</a:t>
             </a:fld>
             <a:endParaRPr lang="en-US"/>
           </a:p>
@@ -2348,7 +2348,7 @@
           <a:p>
             <a:fld id="{11D67388-0790-496E-9A12-37055489AF4F}" type="datetimeFigureOut">
               <a:rPr lang="en-US" smtClean="0"/>
-              <a:t>11/16/2018</a:t>
+              <a:t>12/12/2018</a:t>
             </a:fld>
             <a:endParaRPr lang="en-US"/>
           </a:p>
@@ -2443,7 +2443,7 @@
           <a:p>
             <a:fld id="{11D67388-0790-496E-9A12-37055489AF4F}" type="datetimeFigureOut">
               <a:rPr lang="en-US" smtClean="0"/>
-              <a:t>11/16/2018</a:t>
+              <a:t>12/12/2018</a:t>
             </a:fld>
             <a:endParaRPr lang="en-US"/>
           </a:p>
@@ -2720,7 +2720,7 @@
           <a:p>
             <a:fld id="{11D67388-0790-496E-9A12-37055489AF4F}" type="datetimeFigureOut">
               <a:rPr lang="en-US" smtClean="0"/>
-              <a:t>11/16/2018</a:t>
+              <a:t>12/12/2018</a:t>
             </a:fld>
             <a:endParaRPr lang="en-US"/>
           </a:p>
@@ -2973,7 +2973,7 @@
           <a:p>
             <a:fld id="{11D67388-0790-496E-9A12-37055489AF4F}" type="datetimeFigureOut">
               <a:rPr lang="en-US" smtClean="0"/>
-              <a:t>11/16/2018</a:t>
+              <a:t>12/12/2018</a:t>
             </a:fld>
             <a:endParaRPr lang="en-US"/>
           </a:p>
@@ -3186,7 +3186,7 @@
           <a:p>
             <a:fld id="{11D67388-0790-496E-9A12-37055489AF4F}" type="datetimeFigureOut">
               <a:rPr lang="en-US" smtClean="0"/>
-              <a:t>11/16/2018</a:t>
+              <a:t>12/12/2018</a:t>
             </a:fld>
             <a:endParaRPr lang="en-US"/>
           </a:p>
@@ -3708,7 +3708,7 @@
                   <a:schemeClr val="tx1"/>
                 </a:solidFill>
               </a:rPr>
-              <a:t>SRN</a:t>
+              <a:t>Metis</a:t>
             </a:r>
             <a:endParaRPr lang="en-US" dirty="0" smtClean="0">
               <a:solidFill>
@@ -4369,11 +4369,6 @@
               </a:rPr>
               <a:t>Create combined plots to compare regions</a:t>
             </a:r>
-            <a:endParaRPr lang="en-US" sz="1400" dirty="0">
-              <a:solidFill>
-                <a:schemeClr val="tx1"/>
-              </a:solidFill>
-            </a:endParaRPr>
           </a:p>
         </p:txBody>
       </p:sp>
@@ -4455,11 +4450,6 @@
               </a:rPr>
               <a:t>Create combined maps to compare regions</a:t>
             </a:r>
-            <a:endParaRPr lang="en-US" sz="1400" dirty="0">
-              <a:solidFill>
-                <a:schemeClr val="tx1"/>
-              </a:solidFill>
-            </a:endParaRPr>
           </a:p>
         </p:txBody>
       </p:sp>
@@ -4513,11 +4503,6 @@
               </a:rPr>
               <a:t>Create links between different sectors</a:t>
             </a:r>
-            <a:endParaRPr lang="en-US" sz="1400" dirty="0">
-              <a:solidFill>
-                <a:schemeClr val="tx1"/>
-              </a:solidFill>
-            </a:endParaRPr>
           </a:p>
           <a:p>
             <a:pPr marL="285750" indent="-285750">
@@ -4815,15 +4800,7 @@
                   <a:schemeClr val="tx1"/>
                 </a:solidFill>
               </a:rPr>
-              <a:t>s</a:t>
-            </a:r>
-            <a:r>
-              <a:rPr lang="en-US" sz="1400" dirty="0" smtClean="0">
-                <a:solidFill>
-                  <a:schemeClr val="tx1"/>
-                </a:solidFill>
-              </a:rPr>
-              <a:t>rn.readgcam.R</a:t>
+              <a:t>metis.readgcam.R</a:t>
             </a:r>
             <a:endParaRPr lang="en-US" sz="1400" dirty="0">
               <a:solidFill>
@@ -4841,8 +4818,8 @@
         </p:nvSpPr>
         <p:spPr>
           <a:xfrm>
-            <a:off x="4580344" y="2489427"/>
-            <a:ext cx="2060800" cy="450526"/>
+            <a:off x="4577800" y="2504891"/>
+            <a:ext cx="2220506" cy="377526"/>
           </a:xfrm>
           <a:prstGeom prst="roundRect">
             <a:avLst/>
@@ -4881,37 +4858,26 @@
                   <a:schemeClr val="tx1"/>
                 </a:solidFill>
               </a:rPr>
-              <a:t>s</a:t>
-            </a:r>
+              <a:t>metis.chartsProcess.R</a:t>
+            </a:r>
+            <a:endParaRPr lang="en-US" sz="1400" dirty="0" smtClean="0">
+              <a:solidFill>
+                <a:schemeClr val="tx1"/>
+              </a:solidFill>
+            </a:endParaRPr>
+          </a:p>
+          <a:p>
+            <a:pPr marL="285750" indent="-285750">
+              <a:buFontTx/>
+              <a:buChar char="-"/>
+            </a:pPr>
             <a:r>
               <a:rPr lang="en-US" sz="1400" dirty="0" smtClean="0">
                 <a:solidFill>
                   <a:schemeClr val="tx1"/>
                 </a:solidFill>
               </a:rPr>
-              <a:t>rn.chartsProcess.R</a:t>
-            </a:r>
-          </a:p>
-          <a:p>
-            <a:pPr marL="285750" indent="-285750">
-              <a:buFontTx/>
-              <a:buChar char="-"/>
-            </a:pPr>
-            <a:r>
-              <a:rPr lang="en-US" sz="1400" dirty="0">
-                <a:solidFill>
-                  <a:schemeClr val="tx1"/>
-                </a:solidFill>
-              </a:rPr>
-              <a:t>s</a:t>
-            </a:r>
-            <a:r>
-              <a:rPr lang="en-US" sz="1400" dirty="0" smtClean="0">
-                <a:solidFill>
-                  <a:schemeClr val="tx1"/>
-                </a:solidFill>
-              </a:rPr>
-              <a:t>rn.chart.R</a:t>
+              <a:t>metis.chart.R</a:t>
             </a:r>
             <a:endParaRPr lang="en-US" sz="1400" dirty="0">
               <a:solidFill>
@@ -4929,8 +4895,8 @@
         </p:nvSpPr>
         <p:spPr>
           <a:xfrm>
-            <a:off x="4580344" y="3547751"/>
-            <a:ext cx="2060800" cy="450526"/>
+            <a:off x="4580344" y="3464103"/>
+            <a:ext cx="2060800" cy="622694"/>
           </a:xfrm>
           <a:prstGeom prst="roundRect">
             <a:avLst/>
@@ -4969,16 +4935,27 @@
                   <a:schemeClr val="tx1"/>
                 </a:solidFill>
               </a:rPr>
-              <a:t>s</a:t>
-            </a:r>
+              <a:t>metis.grid2poly</a:t>
+            </a:r>
+          </a:p>
+          <a:p>
+            <a:pPr marL="285750" indent="-285750">
+              <a:buFontTx/>
+              <a:buChar char="-"/>
+            </a:pPr>
             <a:r>
               <a:rPr lang="en-US" sz="1400" dirty="0" smtClean="0">
                 <a:solidFill>
                   <a:schemeClr val="tx1"/>
                 </a:solidFill>
               </a:rPr>
-              <a:t>rn.mapsProcess.R</a:t>
-            </a:r>
+              <a:t>metis.mapsProcess.R</a:t>
+            </a:r>
+            <a:endParaRPr lang="en-US" sz="1400" dirty="0" smtClean="0">
+              <a:solidFill>
+                <a:schemeClr val="tx1"/>
+              </a:solidFill>
+            </a:endParaRPr>
           </a:p>
           <a:p>
             <a:pPr marL="285750" indent="-285750">
@@ -4991,7 +4968,7 @@
                   <a:schemeClr val="tx1"/>
                 </a:solidFill>
               </a:rPr>
-              <a:t>srn.map.R</a:t>
+              <a:t>metis.map.R</a:t>
             </a:r>
             <a:endParaRPr lang="en-US" sz="1400" dirty="0">
               <a:solidFill>
@@ -5439,8 +5416,8 @@
         </p:nvSpPr>
         <p:spPr>
           <a:xfrm>
-            <a:off x="4392013" y="945808"/>
-            <a:ext cx="1691097" cy="304527"/>
+            <a:off x="4063894" y="931206"/>
+            <a:ext cx="1950973" cy="312001"/>
           </a:xfrm>
           <a:prstGeom prst="roundRect">
             <a:avLst/>
@@ -5479,7 +5456,7 @@
                   <a:schemeClr val="tx1"/>
                 </a:solidFill>
               </a:rPr>
-              <a:t>srn.readgcam.R</a:t>
+              <a:t>metis.readgcam.R</a:t>
             </a:r>
             <a:endParaRPr lang="en-US" dirty="0">
               <a:solidFill>
@@ -5497,8 +5474,8 @@
         </p:nvSpPr>
         <p:spPr>
           <a:xfrm>
-            <a:off x="4196464" y="1899683"/>
-            <a:ext cx="2137139" cy="590466"/>
+            <a:off x="4040282" y="1899683"/>
+            <a:ext cx="2388522" cy="590466"/>
           </a:xfrm>
           <a:prstGeom prst="roundRect">
             <a:avLst/>
@@ -5537,8 +5514,13 @@
                   <a:schemeClr val="tx1"/>
                 </a:solidFill>
               </a:rPr>
-              <a:t>srn.chartsProcess.R</a:t>
-            </a:r>
+              <a:t>metis.chartsProcess.R</a:t>
+            </a:r>
+            <a:endParaRPr lang="en-US" dirty="0" smtClean="0">
+              <a:solidFill>
+                <a:schemeClr val="tx1"/>
+              </a:solidFill>
+            </a:endParaRPr>
           </a:p>
           <a:p>
             <a:pPr algn="ctr"/>
@@ -5548,7 +5530,7 @@
                   <a:schemeClr val="tx1"/>
                 </a:solidFill>
               </a:rPr>
-              <a:t>srn.chart.R</a:t>
+              <a:t>metis.chart.R</a:t>
             </a:r>
             <a:endParaRPr lang="en-US" dirty="0">
               <a:solidFill>
@@ -5566,8 +5548,8 @@
         </p:nvSpPr>
         <p:spPr>
           <a:xfrm>
-            <a:off x="4392013" y="3743472"/>
-            <a:ext cx="1691097" cy="304527"/>
+            <a:off x="4290665" y="3758289"/>
+            <a:ext cx="1887755" cy="274210"/>
           </a:xfrm>
           <a:prstGeom prst="roundRect">
             <a:avLst/>
@@ -5606,7 +5588,7 @@
                   <a:schemeClr val="tx1"/>
                 </a:solidFill>
               </a:rPr>
-              <a:t>srn.grid2poly.R</a:t>
+              <a:t>metis.grid2poly.R</a:t>
             </a:r>
             <a:endParaRPr lang="en-US" dirty="0">
               <a:solidFill>
@@ -5624,7 +5606,7 @@
         </p:nvSpPr>
         <p:spPr>
           <a:xfrm>
-            <a:off x="4388995" y="5675958"/>
+            <a:off x="4388993" y="5689432"/>
             <a:ext cx="1691097" cy="304527"/>
           </a:xfrm>
           <a:prstGeom prst="roundRect">
@@ -5659,12 +5641,12 @@
           <a:p>
             <a:pPr algn="ctr"/>
             <a:r>
-              <a:rPr lang="en-US" dirty="0" smtClean="0">
+              <a:rPr lang="en-US" dirty="0" err="1" smtClean="0">
                 <a:solidFill>
                   <a:schemeClr val="tx1"/>
                 </a:solidFill>
               </a:rPr>
-              <a:t>srn.maps.R</a:t>
+              <a:t>metis.maps.R</a:t>
             </a:r>
             <a:endParaRPr lang="en-US" dirty="0">
               <a:solidFill>
@@ -5722,34 +5704,18 @@
                   <a:schemeClr val="tx1"/>
                 </a:solidFill>
               </a:rPr>
-              <a:t>GCAM </a:t>
-            </a:r>
+              <a:t>GCAM database</a:t>
+            </a:r>
+          </a:p>
+          <a:p>
+            <a:pPr algn="ctr"/>
             <a:r>
               <a:rPr lang="en-US" sz="1400" dirty="0" smtClean="0">
                 <a:solidFill>
                   <a:schemeClr val="tx1"/>
                 </a:solidFill>
               </a:rPr>
-              <a:t>database</a:t>
-            </a:r>
-          </a:p>
-          <a:p>
-            <a:pPr algn="ctr"/>
-            <a:r>
-              <a:rPr lang="en-US" sz="1400" dirty="0" smtClean="0">
-                <a:solidFill>
-                  <a:schemeClr val="tx1"/>
-                </a:solidFill>
-              </a:rPr>
-              <a:t>Query File</a:t>
-            </a:r>
-            <a:r>
-              <a:rPr lang="en-US" sz="1400" dirty="0" smtClean="0">
-                <a:solidFill>
-                  <a:schemeClr val="tx1"/>
-                </a:solidFill>
-              </a:rPr>
-              <a:t> </a:t>
+              <a:t>Query File </a:t>
             </a:r>
             <a:endParaRPr lang="en-US" sz="1400" dirty="0">
               <a:solidFill>

</xml_diff>